<commit_message>
Updated the contents of the object lifetime prediction paper to the contents in the thesis.
</commit_message>
<xml_diff>
--- a/thesis/phd_talk/PhD_talk.pptx
+++ b/thesis/phd_talk/PhD_talk.pptx
@@ -4,15 +4,18 @@
   <p:sldMasterIdLst>
     <p:sldMasterId id="2147483648" r:id="rId1"/>
   </p:sldMasterIdLst>
+  <p:notesMasterIdLst>
+    <p:notesMasterId r:id="rId41"/>
+  </p:notesMasterIdLst>
   <p:sldIdLst>
     <p:sldId id="257" r:id="rId2"/>
     <p:sldId id="259" r:id="rId3"/>
     <p:sldId id="261" r:id="rId4"/>
     <p:sldId id="263" r:id="rId5"/>
     <p:sldId id="264" r:id="rId6"/>
-    <p:sldId id="262" r:id="rId7"/>
-    <p:sldId id="266" r:id="rId8"/>
-    <p:sldId id="267" r:id="rId9"/>
+    <p:sldId id="267" r:id="rId7"/>
+    <p:sldId id="300" r:id="rId8"/>
+    <p:sldId id="262" r:id="rId9"/>
     <p:sldId id="265" r:id="rId10"/>
     <p:sldId id="268" r:id="rId11"/>
     <p:sldId id="269" r:id="rId12"/>
@@ -175,6 +178,440 @@
 </p:presentation>
 </file>
 
+<file path=ppt/notesMasters/notesMaster1.xml><?xml version="1.0" encoding="utf-8"?>
+<p:notesMaster xmlns:a="http://schemas.openxmlformats.org/drawingml/2006/main" xmlns:r="http://schemas.openxmlformats.org/officeDocument/2006/relationships" xmlns:p="http://schemas.openxmlformats.org/presentationml/2006/main">
+  <p:cSld>
+    <p:bg>
+      <p:bgRef idx="1001">
+        <a:schemeClr val="bg1"/>
+      </p:bgRef>
+    </p:bg>
+    <p:spTree>
+      <p:nvGrpSpPr>
+        <p:cNvPr id="1" name=""/>
+        <p:cNvGrpSpPr/>
+        <p:nvPr/>
+      </p:nvGrpSpPr>
+      <p:grpSpPr>
+        <a:xfrm>
+          <a:off x="0" y="0"/>
+          <a:ext cx="0" cy="0"/>
+          <a:chOff x="0" y="0"/>
+          <a:chExt cx="0" cy="0"/>
+        </a:xfrm>
+      </p:grpSpPr>
+      <p:sp>
+        <p:nvSpPr>
+          <p:cNvPr id="2" name="Header Placeholder 1"/>
+          <p:cNvSpPr>
+            <a:spLocks noGrp="1"/>
+          </p:cNvSpPr>
+          <p:nvPr>
+            <p:ph type="hdr" sz="quarter"/>
+          </p:nvPr>
+        </p:nvSpPr>
+        <p:spPr>
+          <a:xfrm>
+            <a:off x="0" y="0"/>
+            <a:ext cx="2971800" cy="457200"/>
+          </a:xfrm>
+          <a:prstGeom prst="rect">
+            <a:avLst/>
+          </a:prstGeom>
+        </p:spPr>
+        <p:txBody>
+          <a:bodyPr vert="horz" lIns="91440" tIns="45720" rIns="91440" bIns="45720" rtlCol="0"/>
+          <a:lstStyle>
+            <a:lvl1pPr algn="l">
+              <a:defRPr sz="1200"/>
+            </a:lvl1pPr>
+          </a:lstStyle>
+          <a:p>
+            <a:endParaRPr lang="en-US"/>
+          </a:p>
+        </p:txBody>
+      </p:sp>
+      <p:sp>
+        <p:nvSpPr>
+          <p:cNvPr id="3" name="Date Placeholder 2"/>
+          <p:cNvSpPr>
+            <a:spLocks noGrp="1"/>
+          </p:cNvSpPr>
+          <p:nvPr>
+            <p:ph type="dt" idx="1"/>
+          </p:nvPr>
+        </p:nvSpPr>
+        <p:spPr>
+          <a:xfrm>
+            <a:off x="3884613" y="0"/>
+            <a:ext cx="2971800" cy="457200"/>
+          </a:xfrm>
+          <a:prstGeom prst="rect">
+            <a:avLst/>
+          </a:prstGeom>
+        </p:spPr>
+        <p:txBody>
+          <a:bodyPr vert="horz" lIns="91440" tIns="45720" rIns="91440" bIns="45720" rtlCol="0"/>
+          <a:lstStyle>
+            <a:lvl1pPr algn="r">
+              <a:defRPr sz="1200"/>
+            </a:lvl1pPr>
+          </a:lstStyle>
+          <a:p>
+            <a:fld id="{F88DE0FE-EC7B-4448-A476-ADBFEDF282ED}" type="datetimeFigureOut">
+              <a:rPr lang="en-US" smtClean="0"/>
+              <a:t>2012/10/08</a:t>
+            </a:fld>
+            <a:endParaRPr lang="en-US"/>
+          </a:p>
+        </p:txBody>
+      </p:sp>
+      <p:sp>
+        <p:nvSpPr>
+          <p:cNvPr id="4" name="Slide Image Placeholder 3"/>
+          <p:cNvSpPr>
+            <a:spLocks noGrp="1" noRot="1" noChangeAspect="1"/>
+          </p:cNvSpPr>
+          <p:nvPr>
+            <p:ph type="sldImg" idx="2"/>
+          </p:nvPr>
+        </p:nvSpPr>
+        <p:spPr>
+          <a:xfrm>
+            <a:off x="1143000" y="685800"/>
+            <a:ext cx="4572000" cy="3429000"/>
+          </a:xfrm>
+          <a:prstGeom prst="rect">
+            <a:avLst/>
+          </a:prstGeom>
+          <a:noFill/>
+          <a:ln w="12700">
+            <a:solidFill>
+              <a:prstClr val="black"/>
+            </a:solidFill>
+          </a:ln>
+        </p:spPr>
+        <p:txBody>
+          <a:bodyPr vert="horz" lIns="91440" tIns="45720" rIns="91440" bIns="45720" rtlCol="0" anchor="ctr"/>
+          <a:lstStyle/>
+          <a:p>
+            <a:endParaRPr lang="en-US"/>
+          </a:p>
+        </p:txBody>
+      </p:sp>
+      <p:sp>
+        <p:nvSpPr>
+          <p:cNvPr id="5" name="Notes Placeholder 4"/>
+          <p:cNvSpPr>
+            <a:spLocks noGrp="1"/>
+          </p:cNvSpPr>
+          <p:nvPr>
+            <p:ph type="body" sz="quarter" idx="3"/>
+          </p:nvPr>
+        </p:nvSpPr>
+        <p:spPr>
+          <a:xfrm>
+            <a:off x="685800" y="4343400"/>
+            <a:ext cx="5486400" cy="4114800"/>
+          </a:xfrm>
+          <a:prstGeom prst="rect">
+            <a:avLst/>
+          </a:prstGeom>
+        </p:spPr>
+        <p:txBody>
+          <a:bodyPr vert="horz" lIns="91440" tIns="45720" rIns="91440" bIns="45720" rtlCol="0"/>
+          <a:lstStyle/>
+          <a:p>
+            <a:pPr lvl="0"/>
+            <a:r>
+              <a:rPr lang="en-US" smtClean="0"/>
+              <a:t>Click to edit Master text styles</a:t>
+            </a:r>
+          </a:p>
+          <a:p>
+            <a:pPr lvl="1"/>
+            <a:r>
+              <a:rPr lang="en-US" smtClean="0"/>
+              <a:t>Second level</a:t>
+            </a:r>
+          </a:p>
+          <a:p>
+            <a:pPr lvl="2"/>
+            <a:r>
+              <a:rPr lang="en-US" smtClean="0"/>
+              <a:t>Third level</a:t>
+            </a:r>
+          </a:p>
+          <a:p>
+            <a:pPr lvl="3"/>
+            <a:r>
+              <a:rPr lang="en-US" smtClean="0"/>
+              <a:t>Fourth level</a:t>
+            </a:r>
+          </a:p>
+          <a:p>
+            <a:pPr lvl="4"/>
+            <a:r>
+              <a:rPr lang="en-US" smtClean="0"/>
+              <a:t>Fifth level</a:t>
+            </a:r>
+            <a:endParaRPr lang="en-US"/>
+          </a:p>
+        </p:txBody>
+      </p:sp>
+      <p:sp>
+        <p:nvSpPr>
+          <p:cNvPr id="6" name="Footer Placeholder 5"/>
+          <p:cNvSpPr>
+            <a:spLocks noGrp="1"/>
+          </p:cNvSpPr>
+          <p:nvPr>
+            <p:ph type="ftr" sz="quarter" idx="4"/>
+          </p:nvPr>
+        </p:nvSpPr>
+        <p:spPr>
+          <a:xfrm>
+            <a:off x="0" y="8685213"/>
+            <a:ext cx="2971800" cy="457200"/>
+          </a:xfrm>
+          <a:prstGeom prst="rect">
+            <a:avLst/>
+          </a:prstGeom>
+        </p:spPr>
+        <p:txBody>
+          <a:bodyPr vert="horz" lIns="91440" tIns="45720" rIns="91440" bIns="45720" rtlCol="0" anchor="b"/>
+          <a:lstStyle>
+            <a:lvl1pPr algn="l">
+              <a:defRPr sz="1200"/>
+            </a:lvl1pPr>
+          </a:lstStyle>
+          <a:p>
+            <a:endParaRPr lang="en-US"/>
+          </a:p>
+        </p:txBody>
+      </p:sp>
+      <p:sp>
+        <p:nvSpPr>
+          <p:cNvPr id="7" name="Slide Number Placeholder 6"/>
+          <p:cNvSpPr>
+            <a:spLocks noGrp="1"/>
+          </p:cNvSpPr>
+          <p:nvPr>
+            <p:ph type="sldNum" sz="quarter" idx="5"/>
+          </p:nvPr>
+        </p:nvSpPr>
+        <p:spPr>
+          <a:xfrm>
+            <a:off x="3884613" y="8685213"/>
+            <a:ext cx="2971800" cy="457200"/>
+          </a:xfrm>
+          <a:prstGeom prst="rect">
+            <a:avLst/>
+          </a:prstGeom>
+        </p:spPr>
+        <p:txBody>
+          <a:bodyPr vert="horz" lIns="91440" tIns="45720" rIns="91440" bIns="45720" rtlCol="0" anchor="b"/>
+          <a:lstStyle>
+            <a:lvl1pPr algn="r">
+              <a:defRPr sz="1200"/>
+            </a:lvl1pPr>
+          </a:lstStyle>
+          <a:p>
+            <a:fld id="{D4231AF1-F3E1-464A-AEFC-6647F4ADC47E}" type="slidenum">
+              <a:rPr lang="en-US" smtClean="0"/>
+              <a:t>‹#›</a:t>
+            </a:fld>
+            <a:endParaRPr lang="en-US"/>
+          </a:p>
+        </p:txBody>
+      </p:sp>
+    </p:spTree>
+    <p:extLst>
+      <p:ext uri="{BB962C8B-B14F-4D97-AF65-F5344CB8AC3E}">
+        <p14:creationId xmlns:p14="http://schemas.microsoft.com/office/powerpoint/2010/main" val="732802971"/>
+      </p:ext>
+    </p:extLst>
+  </p:cSld>
+  <p:clrMap bg1="lt1" tx1="dk1" bg2="lt2" tx2="dk2" accent1="accent1" accent2="accent2" accent3="accent3" accent4="accent4" accent5="accent5" accent6="accent6" hlink="hlink" folHlink="folHlink"/>
+  <p:notesStyle>
+    <a:lvl1pPr marL="0" algn="l" defTabSz="457200" rtl="0" eaLnBrk="1" latinLnBrk="0" hangingPunct="1">
+      <a:defRPr sz="1200" kern="1200">
+        <a:solidFill>
+          <a:schemeClr val="tx1"/>
+        </a:solidFill>
+        <a:latin typeface="+mn-lt"/>
+        <a:ea typeface="+mn-ea"/>
+        <a:cs typeface="+mn-cs"/>
+      </a:defRPr>
+    </a:lvl1pPr>
+    <a:lvl2pPr marL="457200" algn="l" defTabSz="457200" rtl="0" eaLnBrk="1" latinLnBrk="0" hangingPunct="1">
+      <a:defRPr sz="1200" kern="1200">
+        <a:solidFill>
+          <a:schemeClr val="tx1"/>
+        </a:solidFill>
+        <a:latin typeface="+mn-lt"/>
+        <a:ea typeface="+mn-ea"/>
+        <a:cs typeface="+mn-cs"/>
+      </a:defRPr>
+    </a:lvl2pPr>
+    <a:lvl3pPr marL="914400" algn="l" defTabSz="457200" rtl="0" eaLnBrk="1" latinLnBrk="0" hangingPunct="1">
+      <a:defRPr sz="1200" kern="1200">
+        <a:solidFill>
+          <a:schemeClr val="tx1"/>
+        </a:solidFill>
+        <a:latin typeface="+mn-lt"/>
+        <a:ea typeface="+mn-ea"/>
+        <a:cs typeface="+mn-cs"/>
+      </a:defRPr>
+    </a:lvl3pPr>
+    <a:lvl4pPr marL="1371600" algn="l" defTabSz="457200" rtl="0" eaLnBrk="1" latinLnBrk="0" hangingPunct="1">
+      <a:defRPr sz="1200" kern="1200">
+        <a:solidFill>
+          <a:schemeClr val="tx1"/>
+        </a:solidFill>
+        <a:latin typeface="+mn-lt"/>
+        <a:ea typeface="+mn-ea"/>
+        <a:cs typeface="+mn-cs"/>
+      </a:defRPr>
+    </a:lvl4pPr>
+    <a:lvl5pPr marL="1828800" algn="l" defTabSz="457200" rtl="0" eaLnBrk="1" latinLnBrk="0" hangingPunct="1">
+      <a:defRPr sz="1200" kern="1200">
+        <a:solidFill>
+          <a:schemeClr val="tx1"/>
+        </a:solidFill>
+        <a:latin typeface="+mn-lt"/>
+        <a:ea typeface="+mn-ea"/>
+        <a:cs typeface="+mn-cs"/>
+      </a:defRPr>
+    </a:lvl5pPr>
+    <a:lvl6pPr marL="2286000" algn="l" defTabSz="457200" rtl="0" eaLnBrk="1" latinLnBrk="0" hangingPunct="1">
+      <a:defRPr sz="1200" kern="1200">
+        <a:solidFill>
+          <a:schemeClr val="tx1"/>
+        </a:solidFill>
+        <a:latin typeface="+mn-lt"/>
+        <a:ea typeface="+mn-ea"/>
+        <a:cs typeface="+mn-cs"/>
+      </a:defRPr>
+    </a:lvl6pPr>
+    <a:lvl7pPr marL="2743200" algn="l" defTabSz="457200" rtl="0" eaLnBrk="1" latinLnBrk="0" hangingPunct="1">
+      <a:defRPr sz="1200" kern="1200">
+        <a:solidFill>
+          <a:schemeClr val="tx1"/>
+        </a:solidFill>
+        <a:latin typeface="+mn-lt"/>
+        <a:ea typeface="+mn-ea"/>
+        <a:cs typeface="+mn-cs"/>
+      </a:defRPr>
+    </a:lvl7pPr>
+    <a:lvl8pPr marL="3200400" algn="l" defTabSz="457200" rtl="0" eaLnBrk="1" latinLnBrk="0" hangingPunct="1">
+      <a:defRPr sz="1200" kern="1200">
+        <a:solidFill>
+          <a:schemeClr val="tx1"/>
+        </a:solidFill>
+        <a:latin typeface="+mn-lt"/>
+        <a:ea typeface="+mn-ea"/>
+        <a:cs typeface="+mn-cs"/>
+      </a:defRPr>
+    </a:lvl8pPr>
+    <a:lvl9pPr marL="3657600" algn="l" defTabSz="457200" rtl="0" eaLnBrk="1" latinLnBrk="0" hangingPunct="1">
+      <a:defRPr sz="1200" kern="1200">
+        <a:solidFill>
+          <a:schemeClr val="tx1"/>
+        </a:solidFill>
+        <a:latin typeface="+mn-lt"/>
+        <a:ea typeface="+mn-ea"/>
+        <a:cs typeface="+mn-cs"/>
+      </a:defRPr>
+    </a:lvl9pPr>
+  </p:notesStyle>
+</p:notesMaster>
+</file>
+
+<file path=ppt/notesSlides/notesSlide1.xml><?xml version="1.0" encoding="utf-8"?>
+<p:notes xmlns:a="http://schemas.openxmlformats.org/drawingml/2006/main" xmlns:r="http://schemas.openxmlformats.org/officeDocument/2006/relationships" xmlns:p="http://schemas.openxmlformats.org/presentationml/2006/main">
+  <p:cSld>
+    <p:spTree>
+      <p:nvGrpSpPr>
+        <p:cNvPr id="1" name=""/>
+        <p:cNvGrpSpPr/>
+        <p:nvPr/>
+      </p:nvGrpSpPr>
+      <p:grpSpPr>
+        <a:xfrm>
+          <a:off x="0" y="0"/>
+          <a:ext cx="0" cy="0"/>
+          <a:chOff x="0" y="0"/>
+          <a:chExt cx="0" cy="0"/>
+        </a:xfrm>
+      </p:grpSpPr>
+      <p:sp>
+        <p:nvSpPr>
+          <p:cNvPr id="2" name="Slide Image Placeholder 1"/>
+          <p:cNvSpPr>
+            <a:spLocks noGrp="1" noRot="1" noChangeAspect="1"/>
+          </p:cNvSpPr>
+          <p:nvPr>
+            <p:ph type="sldImg"/>
+          </p:nvPr>
+        </p:nvSpPr>
+        <p:spPr/>
+      </p:sp>
+      <p:sp>
+        <p:nvSpPr>
+          <p:cNvPr id="3" name="Notes Placeholder 2"/>
+          <p:cNvSpPr>
+            <a:spLocks noGrp="1"/>
+          </p:cNvSpPr>
+          <p:nvPr>
+            <p:ph type="body" idx="1"/>
+          </p:nvPr>
+        </p:nvSpPr>
+        <p:spPr/>
+        <p:txBody>
+          <a:bodyPr/>
+          <a:lstStyle/>
+          <a:p>
+            <a:endParaRPr lang="en-US" dirty="0"/>
+          </a:p>
+        </p:txBody>
+      </p:sp>
+      <p:sp>
+        <p:nvSpPr>
+          <p:cNvPr id="4" name="Slide Number Placeholder 3"/>
+          <p:cNvSpPr>
+            <a:spLocks noGrp="1"/>
+          </p:cNvSpPr>
+          <p:nvPr>
+            <p:ph type="sldNum" sz="quarter" idx="10"/>
+          </p:nvPr>
+        </p:nvSpPr>
+        <p:spPr/>
+        <p:txBody>
+          <a:bodyPr/>
+          <a:lstStyle/>
+          <a:p>
+            <a:fld id="{D4231AF1-F3E1-464A-AEFC-6647F4ADC47E}" type="slidenum">
+              <a:rPr lang="en-US" smtClean="0"/>
+              <a:t>8</a:t>
+            </a:fld>
+            <a:endParaRPr lang="en-US"/>
+          </a:p>
+        </p:txBody>
+      </p:sp>
+    </p:spTree>
+    <p:extLst>
+      <p:ext uri="{BB962C8B-B14F-4D97-AF65-F5344CB8AC3E}">
+        <p14:creationId xmlns:p14="http://schemas.microsoft.com/office/powerpoint/2010/main" val="1396222083"/>
+      </p:ext>
+    </p:extLst>
+  </p:cSld>
+  <p:clrMapOvr>
+    <a:masterClrMapping/>
+  </p:clrMapOvr>
+</p:notes>
+</file>
+
 <file path=ppt/slideLayouts/slideLayout1.xml><?xml version="1.0" encoding="utf-8"?>
 <p:sldLayout xmlns:a="http://schemas.openxmlformats.org/drawingml/2006/main" xmlns:r="http://schemas.openxmlformats.org/officeDocument/2006/relationships" xmlns:p="http://schemas.openxmlformats.org/presentationml/2006/main" type="title" preserve="1">
   <p:cSld name="Title Slide">
@@ -361,7 +798,7 @@
             <a:fld id="{3DBDE37E-CB06-4B79-93C7-D4500F90DA3C}" type="datetimeFigureOut">
               <a:rPr lang="en-US"/>
               <a:pPr/>
-              <a:t>10/5/2012</a:t>
+              <a:t>2012/10/08</a:t>
             </a:fld>
             <a:endParaRPr lang="en-US"/>
           </a:p>
@@ -543,7 +980,7 @@
             <a:fld id="{7CB2F816-2217-40FD-9E22-A5E5B0FC88D0}" type="datetimeFigureOut">
               <a:rPr lang="en-US"/>
               <a:pPr/>
-              <a:t>10/5/2012</a:t>
+              <a:t>2012/10/08</a:t>
             </a:fld>
             <a:endParaRPr lang="en-US"/>
           </a:p>
@@ -735,7 +1172,7 @@
             <a:fld id="{5871EF02-FB29-402D-BF2D-2F5D78358143}" type="datetimeFigureOut">
               <a:rPr lang="en-US"/>
               <a:pPr/>
-              <a:t>10/5/2012</a:t>
+              <a:t>2012/10/08</a:t>
             </a:fld>
             <a:endParaRPr lang="en-US"/>
           </a:p>
@@ -917,7 +1354,7 @@
             <a:fld id="{1F90F688-57D1-4A5E-805A-AA6F666E6DCB}" type="datetimeFigureOut">
               <a:rPr lang="en-US"/>
               <a:pPr/>
-              <a:t>10/5/2012</a:t>
+              <a:t>2012/10/08</a:t>
             </a:fld>
             <a:endParaRPr lang="en-US"/>
           </a:p>
@@ -1175,7 +1612,7 @@
             <a:fld id="{86316768-ED5F-4643-8F34-0BAA5D945208}" type="datetimeFigureOut">
               <a:rPr lang="en-US"/>
               <a:pPr/>
-              <a:t>10/5/2012</a:t>
+              <a:t>2012/10/08</a:t>
             </a:fld>
             <a:endParaRPr lang="en-US"/>
           </a:p>
@@ -1475,7 +1912,7 @@
             <a:fld id="{A664E57C-7D30-46AE-AD4F-3EFB2ECCC049}" type="datetimeFigureOut">
               <a:rPr lang="en-US"/>
               <a:pPr/>
-              <a:t>10/5/2012</a:t>
+              <a:t>2012/10/08</a:t>
             </a:fld>
             <a:endParaRPr lang="en-US"/>
           </a:p>
@@ -1909,7 +2346,7 @@
             <a:fld id="{D50E77B1-474C-4335-8D3B-BB9255ACA0F4}" type="datetimeFigureOut">
               <a:rPr lang="en-US"/>
               <a:pPr/>
-              <a:t>10/5/2012</a:t>
+              <a:t>2012/10/08</a:t>
             </a:fld>
             <a:endParaRPr lang="en-US"/>
           </a:p>
@@ -2039,7 +2476,7 @@
             <a:fld id="{4D7E6BEE-916F-42A8-82C0-F4F82EEEFC0F}" type="datetimeFigureOut">
               <a:rPr lang="en-US"/>
               <a:pPr/>
-              <a:t>10/5/2012</a:t>
+              <a:t>2012/10/08</a:t>
             </a:fld>
             <a:endParaRPr lang="en-US"/>
           </a:p>
@@ -2146,7 +2583,7 @@
             <a:fld id="{BB646075-2E99-4691-9340-AC68F28C0357}" type="datetimeFigureOut">
               <a:rPr lang="en-US"/>
               <a:pPr/>
-              <a:t>10/5/2012</a:t>
+              <a:t>2012/10/08</a:t>
             </a:fld>
             <a:endParaRPr lang="en-US"/>
           </a:p>
@@ -2435,7 +2872,7 @@
             <a:fld id="{8B41057B-B950-4B6F-ACDD-19CE23549766}" type="datetimeFigureOut">
               <a:rPr lang="en-US"/>
               <a:pPr/>
-              <a:t>10/5/2012</a:t>
+              <a:t>2012/10/08</a:t>
             </a:fld>
             <a:endParaRPr lang="en-US"/>
           </a:p>
@@ -2703,7 +3140,7 @@
             <a:fld id="{31165655-5886-46BE-B326-4B99FC0DC3F5}" type="datetimeFigureOut">
               <a:rPr lang="en-US"/>
               <a:pPr/>
-              <a:t>10/5/2012</a:t>
+              <a:t>2012/10/08</a:t>
             </a:fld>
             <a:endParaRPr lang="en-US"/>
           </a:p>
@@ -2945,7 +3382,7 @@
             <a:fld id="{6435AD0D-B3E0-406E-A544-B05638F212A1}" type="datetimeFigureOut">
               <a:rPr lang="en-US"/>
               <a:pPr/>
-              <a:t>10/5/2012</a:t>
+              <a:t>2012/10/08</a:t>
             </a:fld>
             <a:endParaRPr lang="en-US"/>
           </a:p>
@@ -3590,11 +4027,6 @@
               </a:rPr>
               <a:t>John Gilmore</a:t>
             </a:r>
-            <a:endParaRPr lang="en-US" dirty="0" smtClean="0">
-              <a:solidFill>
-                <a:schemeClr val="bg1"/>
-              </a:solidFill>
-            </a:endParaRPr>
           </a:p>
         </p:txBody>
       </p:sp>
@@ -3779,10 +4211,18 @@
   <p:clrMapOvr>
     <a:masterClrMapping/>
   </p:clrMapOvr>
+  <mc:AlternateContent xmlns:mc="http://schemas.openxmlformats.org/markup-compatibility/2006">
+    <mc:Choice xmlns:p14="http://schemas.microsoft.com/office/powerpoint/2010/main" Requires="p14">
+      <p:transition spd="slow" p14:dur="2000" advTm="3597"/>
+    </mc:Choice>
+    <mc:Fallback>
+      <p:transition xmlns:p14="http://schemas.microsoft.com/office/powerpoint/2010/main" spd="slow" advTm="3597"/>
+    </mc:Fallback>
+  </mc:AlternateContent>
   <p:timing>
     <p:tnLst>
       <p:par>
-        <p:cTn id="1" dur="indefinite" restart="never" nodeType="tmRoot"/>
+        <p:cTn xmlns:p14="http://schemas.microsoft.com/office/powerpoint/2010/main" id="1" dur="indefinite" restart="never" nodeType="tmRoot"/>
       </p:par>
     </p:tnLst>
   </p:timing>
@@ -3878,11 +4318,6 @@
               </a:rPr>
               <a:t>State consistency: terminology</a:t>
             </a:r>
-            <a:endParaRPr lang="en-US" dirty="0" smtClean="0">
-              <a:solidFill>
-                <a:schemeClr val="bg1"/>
-              </a:solidFill>
-            </a:endParaRPr>
           </a:p>
         </p:txBody>
       </p:sp>
@@ -4048,10 +4483,18 @@
   <p:clrMapOvr>
     <a:masterClrMapping/>
   </p:clrMapOvr>
+  <mc:AlternateContent xmlns:mc="http://schemas.openxmlformats.org/markup-compatibility/2006">
+    <mc:Choice xmlns:p14="http://schemas.microsoft.com/office/powerpoint/2010/main" Requires="p14">
+      <p:transition spd="slow" p14:dur="2000" advTm="375"/>
+    </mc:Choice>
+    <mc:Fallback>
+      <p:transition xmlns:p14="http://schemas.microsoft.com/office/powerpoint/2010/main" spd="slow" advTm="375"/>
+    </mc:Fallback>
+  </mc:AlternateContent>
   <p:timing>
     <p:tnLst>
       <p:par>
-        <p:cTn id="1" dur="indefinite" restart="never" nodeType="tmRoot"/>
+        <p:cTn xmlns:p14="http://schemas.microsoft.com/office/powerpoint/2010/main" id="1" dur="indefinite" restart="never" nodeType="tmRoot"/>
       </p:par>
     </p:tnLst>
   </p:timing>
@@ -4059,7 +4502,7 @@
 </file>
 
 <file path=ppt/slides/slide11.xml><?xml version="1.0" encoding="utf-8"?>
-<p:sld xmlns:a="http://schemas.openxmlformats.org/drawingml/2006/main" xmlns:r="http://schemas.openxmlformats.org/officeDocument/2006/relationships" xmlns:p="http://schemas.openxmlformats.org/presentationml/2006/main">
+<p:sld xmlns:a="http://schemas.openxmlformats.org/drawingml/2006/main" xmlns:r="http://schemas.openxmlformats.org/officeDocument/2006/relationships" xmlns:p="http://schemas.openxmlformats.org/presentationml/2006/main" show="0">
   <p:cSld>
     <p:spTree>
       <p:nvGrpSpPr>
@@ -4147,11 +4590,6 @@
               </a:rPr>
               <a:t>State consistency: Object creation</a:t>
             </a:r>
-            <a:endParaRPr lang="en-US" dirty="0" smtClean="0">
-              <a:solidFill>
-                <a:schemeClr val="bg1"/>
-              </a:solidFill>
-            </a:endParaRPr>
           </a:p>
         </p:txBody>
       </p:sp>
@@ -4258,10 +4696,18 @@
   <p:clrMapOvr>
     <a:masterClrMapping/>
   </p:clrMapOvr>
+  <mc:AlternateContent xmlns:mc="http://schemas.openxmlformats.org/markup-compatibility/2006">
+    <mc:Choice xmlns:p14="http://schemas.microsoft.com/office/powerpoint/2010/main" Requires="p14">
+      <p:transition spd="slow" p14:dur="2000"/>
+    </mc:Choice>
+    <mc:Fallback>
+      <p:transition xmlns:p14="http://schemas.microsoft.com/office/powerpoint/2010/main" spd="slow"/>
+    </mc:Fallback>
+  </mc:AlternateContent>
   <p:timing>
     <p:tnLst>
       <p:par>
-        <p:cTn id="1" dur="indefinite" restart="never" nodeType="tmRoot"/>
+        <p:cTn xmlns:p14="http://schemas.microsoft.com/office/powerpoint/2010/main" id="1" dur="indefinite" restart="never" nodeType="tmRoot"/>
       </p:par>
     </p:tnLst>
   </p:timing>
@@ -4269,7 +4715,7 @@
 </file>
 
 <file path=ppt/slides/slide12.xml><?xml version="1.0" encoding="utf-8"?>
-<p:sld xmlns:a="http://schemas.openxmlformats.org/drawingml/2006/main" xmlns:r="http://schemas.openxmlformats.org/officeDocument/2006/relationships" xmlns:p="http://schemas.openxmlformats.org/presentationml/2006/main">
+<p:sld xmlns:a="http://schemas.openxmlformats.org/drawingml/2006/main" xmlns:r="http://schemas.openxmlformats.org/officeDocument/2006/relationships" xmlns:p="http://schemas.openxmlformats.org/presentationml/2006/main" show="0">
   <p:cSld>
     <p:spTree>
       <p:nvGrpSpPr>
@@ -4357,11 +4803,6 @@
               </a:rPr>
               <a:t>State consistency: Object query</a:t>
             </a:r>
-            <a:endParaRPr lang="en-US" dirty="0" smtClean="0">
-              <a:solidFill>
-                <a:schemeClr val="bg1"/>
-              </a:solidFill>
-            </a:endParaRPr>
           </a:p>
         </p:txBody>
       </p:sp>
@@ -4468,10 +4909,18 @@
   <p:clrMapOvr>
     <a:masterClrMapping/>
   </p:clrMapOvr>
+  <mc:AlternateContent xmlns:mc="http://schemas.openxmlformats.org/markup-compatibility/2006">
+    <mc:Choice xmlns:p14="http://schemas.microsoft.com/office/powerpoint/2010/main" Requires="p14">
+      <p:transition spd="slow" p14:dur="2000"/>
+    </mc:Choice>
+    <mc:Fallback>
+      <p:transition xmlns:p14="http://schemas.microsoft.com/office/powerpoint/2010/main" spd="slow"/>
+    </mc:Fallback>
+  </mc:AlternateContent>
   <p:timing>
     <p:tnLst>
       <p:par>
-        <p:cTn id="1" dur="indefinite" restart="never" nodeType="tmRoot"/>
+        <p:cTn xmlns:p14="http://schemas.microsoft.com/office/powerpoint/2010/main" id="1" dur="indefinite" restart="never" nodeType="tmRoot"/>
       </p:par>
     </p:tnLst>
   </p:timing>
@@ -4567,11 +5016,6 @@
               </a:rPr>
               <a:t>State consistency: Object update</a:t>
             </a:r>
-            <a:endParaRPr lang="en-US" dirty="0" smtClean="0">
-              <a:solidFill>
-                <a:schemeClr val="bg1"/>
-              </a:solidFill>
-            </a:endParaRPr>
           </a:p>
         </p:txBody>
       </p:sp>
@@ -4678,10 +5122,18 @@
   <p:clrMapOvr>
     <a:masterClrMapping/>
   </p:clrMapOvr>
+  <mc:AlternateContent xmlns:mc="http://schemas.openxmlformats.org/markup-compatibility/2006">
+    <mc:Choice xmlns:p14="http://schemas.microsoft.com/office/powerpoint/2010/main" Requires="p14">
+      <p:transition spd="slow" p14:dur="2000" advTm="390"/>
+    </mc:Choice>
+    <mc:Fallback>
+      <p:transition xmlns:p14="http://schemas.microsoft.com/office/powerpoint/2010/main" spd="slow" advTm="390"/>
+    </mc:Fallback>
+  </mc:AlternateContent>
   <p:timing>
     <p:tnLst>
       <p:par>
-        <p:cTn id="1" dur="indefinite" restart="never" nodeType="tmRoot"/>
+        <p:cTn xmlns:p14="http://schemas.microsoft.com/office/powerpoint/2010/main" id="1" dur="indefinite" restart="never" nodeType="tmRoot"/>
       </p:par>
     </p:tnLst>
   </p:timing>
@@ -4777,11 +5229,6 @@
               </a:rPr>
               <a:t>Generic state consistency model</a:t>
             </a:r>
-            <a:endParaRPr lang="en-US" dirty="0" smtClean="0">
-              <a:solidFill>
-                <a:schemeClr val="bg1"/>
-              </a:solidFill>
-            </a:endParaRPr>
           </a:p>
         </p:txBody>
       </p:sp>
@@ -4873,10 +5320,18 @@
   <p:clrMapOvr>
     <a:masterClrMapping/>
   </p:clrMapOvr>
+  <mc:AlternateContent xmlns:mc="http://schemas.openxmlformats.org/markup-compatibility/2006">
+    <mc:Choice xmlns:p14="http://schemas.microsoft.com/office/powerpoint/2010/main" Requires="p14">
+      <p:transition spd="slow" p14:dur="2000" advTm="627857"/>
+    </mc:Choice>
+    <mc:Fallback>
+      <p:transition xmlns:p14="http://schemas.microsoft.com/office/powerpoint/2010/main" spd="slow" advTm="627857"/>
+    </mc:Fallback>
+  </mc:AlternateContent>
   <p:timing>
     <p:tnLst>
       <p:par>
-        <p:cTn id="1" dur="indefinite" restart="never" nodeType="tmRoot"/>
+        <p:cTn xmlns:p14="http://schemas.microsoft.com/office/powerpoint/2010/main" id="1" dur="indefinite" restart="never" nodeType="tmRoot"/>
       </p:par>
     </p:tnLst>
   </p:timing>
@@ -4972,11 +5427,6 @@
               </a:rPr>
               <a:t>Classic state consistency</a:t>
             </a:r>
-            <a:endParaRPr lang="en-US" dirty="0" smtClean="0">
-              <a:solidFill>
-                <a:schemeClr val="bg1"/>
-              </a:solidFill>
-            </a:endParaRPr>
           </a:p>
         </p:txBody>
       </p:sp>
@@ -5100,10 +5550,18 @@
   <p:clrMapOvr>
     <a:masterClrMapping/>
   </p:clrMapOvr>
+  <mc:AlternateContent xmlns:mc="http://schemas.openxmlformats.org/markup-compatibility/2006">
+    <mc:Choice xmlns:p14="http://schemas.microsoft.com/office/powerpoint/2010/main" Requires="p14">
+      <p:transition spd="slow" p14:dur="2000" advTm="153"/>
+    </mc:Choice>
+    <mc:Fallback>
+      <p:transition xmlns:p14="http://schemas.microsoft.com/office/powerpoint/2010/main" spd="slow" advTm="153"/>
+    </mc:Fallback>
+  </mc:AlternateContent>
   <p:timing>
     <p:tnLst>
       <p:par>
-        <p:cTn id="1" dur="indefinite" restart="never" nodeType="tmRoot"/>
+        <p:cTn xmlns:p14="http://schemas.microsoft.com/office/powerpoint/2010/main" id="1" dur="indefinite" restart="never" nodeType="tmRoot"/>
       </p:par>
     </p:tnLst>
   </p:timing>
@@ -5199,11 +5657,6 @@
               </a:rPr>
               <a:t>P2P MMVE state consistency</a:t>
             </a:r>
-            <a:endParaRPr lang="en-US" dirty="0" smtClean="0">
-              <a:solidFill>
-                <a:schemeClr val="bg1"/>
-              </a:solidFill>
-            </a:endParaRPr>
           </a:p>
         </p:txBody>
       </p:sp>
@@ -5327,10 +5780,18 @@
   <p:clrMapOvr>
     <a:masterClrMapping/>
   </p:clrMapOvr>
+  <mc:AlternateContent xmlns:mc="http://schemas.openxmlformats.org/markup-compatibility/2006">
+    <mc:Choice xmlns:p14="http://schemas.microsoft.com/office/powerpoint/2010/main" Requires="p14">
+      <p:transition spd="slow" p14:dur="2000" advTm="365"/>
+    </mc:Choice>
+    <mc:Fallback>
+      <p:transition xmlns:p14="http://schemas.microsoft.com/office/powerpoint/2010/main" spd="slow" advTm="365"/>
+    </mc:Fallback>
+  </mc:AlternateContent>
   <p:timing>
     <p:tnLst>
       <p:par>
-        <p:cTn id="1" dur="indefinite" restart="never" nodeType="tmRoot"/>
+        <p:cTn xmlns:p14="http://schemas.microsoft.com/office/powerpoint/2010/main" id="1" dur="indefinite" restart="never" nodeType="tmRoot"/>
       </p:par>
     </p:tnLst>
   </p:timing>
@@ -5426,11 +5887,6 @@
               </a:rPr>
               <a:t>State management and persistency</a:t>
             </a:r>
-            <a:endParaRPr lang="en-US" dirty="0" smtClean="0">
-              <a:solidFill>
-                <a:schemeClr val="bg1"/>
-              </a:solidFill>
-            </a:endParaRPr>
           </a:p>
         </p:txBody>
       </p:sp>
@@ -5552,10 +6008,18 @@
   <p:clrMapOvr>
     <a:masterClrMapping/>
   </p:clrMapOvr>
+  <mc:AlternateContent xmlns:mc="http://schemas.openxmlformats.org/markup-compatibility/2006">
+    <mc:Choice xmlns:p14="http://schemas.microsoft.com/office/powerpoint/2010/main" Requires="p14">
+      <p:transition spd="slow" p14:dur="2000" advTm="52261"/>
+    </mc:Choice>
+    <mc:Fallback>
+      <p:transition xmlns:p14="http://schemas.microsoft.com/office/powerpoint/2010/main" spd="slow" advTm="52261"/>
+    </mc:Fallback>
+  </mc:AlternateContent>
   <p:timing>
     <p:tnLst>
       <p:par>
-        <p:cTn id="1" dur="indefinite" restart="never" nodeType="tmRoot"/>
+        <p:cTn xmlns:p14="http://schemas.microsoft.com/office/powerpoint/2010/main" id="1" dur="indefinite" restart="never" nodeType="tmRoot"/>
       </p:par>
     </p:tnLst>
   </p:timing>
@@ -5651,11 +6115,6 @@
               </a:rPr>
               <a:t>MMVE storage requirements</a:t>
             </a:r>
-            <a:endParaRPr lang="en-US" dirty="0" smtClean="0">
-              <a:solidFill>
-                <a:schemeClr val="bg1"/>
-              </a:solidFill>
-            </a:endParaRPr>
           </a:p>
         </p:txBody>
       </p:sp>
@@ -5810,10 +6269,18 @@
   <p:clrMapOvr>
     <a:masterClrMapping/>
   </p:clrMapOvr>
+  <mc:AlternateContent xmlns:mc="http://schemas.openxmlformats.org/markup-compatibility/2006">
+    <mc:Choice xmlns:p14="http://schemas.microsoft.com/office/powerpoint/2010/main" Requires="p14">
+      <p:transition spd="slow" p14:dur="2000" advTm="12968"/>
+    </mc:Choice>
+    <mc:Fallback>
+      <p:transition xmlns:p14="http://schemas.microsoft.com/office/powerpoint/2010/main" spd="slow" advTm="12968"/>
+    </mc:Fallback>
+  </mc:AlternateContent>
   <p:timing>
     <p:tnLst>
       <p:par>
-        <p:cTn id="1" dur="indefinite" restart="never" nodeType="tmRoot"/>
+        <p:cTn xmlns:p14="http://schemas.microsoft.com/office/powerpoint/2010/main" id="1" dur="indefinite" restart="never" nodeType="tmRoot"/>
       </p:par>
     </p:tnLst>
   </p:timing>
@@ -5909,11 +6376,6 @@
               </a:rPr>
               <a:t>P2P MMVE storage types</a:t>
             </a:r>
-            <a:endParaRPr lang="en-US" dirty="0" smtClean="0">
-              <a:solidFill>
-                <a:schemeClr val="bg1"/>
-              </a:solidFill>
-            </a:endParaRPr>
           </a:p>
         </p:txBody>
       </p:sp>
@@ -6020,10 +6482,18 @@
   <p:clrMapOvr>
     <a:masterClrMapping/>
   </p:clrMapOvr>
+  <mc:AlternateContent xmlns:mc="http://schemas.openxmlformats.org/markup-compatibility/2006">
+    <mc:Choice xmlns:p14="http://schemas.microsoft.com/office/powerpoint/2010/main" Requires="p14">
+      <p:transition spd="slow" p14:dur="2000" advTm="203832"/>
+    </mc:Choice>
+    <mc:Fallback>
+      <p:transition xmlns:p14="http://schemas.microsoft.com/office/powerpoint/2010/main" spd="slow" advTm="203832"/>
+    </mc:Fallback>
+  </mc:AlternateContent>
   <p:timing>
     <p:tnLst>
       <p:par>
-        <p:cTn id="1" dur="indefinite" restart="never" nodeType="tmRoot"/>
+        <p:cTn xmlns:p14="http://schemas.microsoft.com/office/powerpoint/2010/main" id="1" dur="indefinite" restart="never" nodeType="tmRoot"/>
       </p:par>
     </p:tnLst>
   </p:timing>
@@ -6120,12 +6590,6 @@
               </a:rPr>
               <a:t>Outline</a:t>
             </a:r>
-            <a:endParaRPr lang="en-US" dirty="0" smtClean="0">
-              <a:solidFill>
-                <a:schemeClr val="bg1"/>
-              </a:solidFill>
-              <a:latin typeface="Verdana" pitchFamily="34" charset="0"/>
-            </a:endParaRPr>
           </a:p>
         </p:txBody>
       </p:sp>
@@ -6304,10 +6768,18 @@
   <p:clrMapOvr>
     <a:masterClrMapping/>
   </p:clrMapOvr>
+  <mc:AlternateContent xmlns:mc="http://schemas.openxmlformats.org/markup-compatibility/2006">
+    <mc:Choice xmlns:p14="http://schemas.microsoft.com/office/powerpoint/2010/main" Requires="p14">
+      <p:transition spd="slow" p14:dur="2000" advTm="326"/>
+    </mc:Choice>
+    <mc:Fallback>
+      <p:transition xmlns:p14="http://schemas.microsoft.com/office/powerpoint/2010/main" spd="slow" advTm="326"/>
+    </mc:Fallback>
+  </mc:AlternateContent>
   <p:timing>
     <p:tnLst>
       <p:par>
-        <p:cTn id="1" dur="indefinite" restart="never" nodeType="tmRoot"/>
+        <p:cTn xmlns:p14="http://schemas.microsoft.com/office/powerpoint/2010/main" id="1" dur="indefinite" restart="never" nodeType="tmRoot"/>
       </p:par>
     </p:tnLst>
   </p:timing>
@@ -6411,11 +6883,6 @@
               </a:rPr>
               <a:t> design</a:t>
             </a:r>
-            <a:endParaRPr lang="en-US" dirty="0" smtClean="0">
-              <a:solidFill>
-                <a:schemeClr val="bg1"/>
-              </a:solidFill>
-            </a:endParaRPr>
           </a:p>
         </p:txBody>
       </p:sp>
@@ -6463,8 +6930,8 @@
         </p:nvSpPr>
         <p:spPr>
           <a:xfrm>
-            <a:off x="457200" y="1600200"/>
-            <a:ext cx="4086225" cy="4525963"/>
+            <a:off x="279400" y="1600200"/>
+            <a:ext cx="5156200" cy="4525963"/>
           </a:xfrm>
         </p:spPr>
         <p:txBody>
@@ -6478,15 +6945,7 @@
                   <a:schemeClr val="bg1"/>
                 </a:solidFill>
               </a:rPr>
-              <a:t>Fulfil</a:t>
-            </a:r>
-            <a:r>
-              <a:rPr lang="en-US" dirty="0" smtClean="0">
-                <a:solidFill>
-                  <a:schemeClr val="bg1"/>
-                </a:solidFill>
-              </a:rPr>
-              <a:t>l P2P MMVE state management and persistency requirements</a:t>
+              <a:t>Fulfill P2P MMVE state management and persistency requirements</a:t>
             </a:r>
           </a:p>
           <a:p>
@@ -6497,8 +6956,32 @@
                   <a:schemeClr val="bg1"/>
                 </a:solidFill>
               </a:rPr>
-              <a:t>Combine multiple storage models in such a way that the disadvantages are removed.</a:t>
-            </a:r>
+              <a:t>Combine multiple storage models in such a way that the disadvantages are removed</a:t>
+            </a:r>
+            <a:r>
+              <a:rPr lang="en-US" dirty="0" smtClean="0">
+                <a:solidFill>
+                  <a:schemeClr val="bg1"/>
+                </a:solidFill>
+              </a:rPr>
+              <a:t>.</a:t>
+            </a:r>
+          </a:p>
+          <a:p>
+            <a:pPr eaLnBrk="1" hangingPunct="1"/>
+            <a:r>
+              <a:rPr lang="en-US" dirty="0" smtClean="0">
+                <a:solidFill>
+                  <a:schemeClr val="bg1"/>
+                </a:solidFill>
+              </a:rPr>
+              <a:t>Satisfy the use cases</a:t>
+            </a:r>
+            <a:endParaRPr lang="en-US" dirty="0" smtClean="0">
+              <a:solidFill>
+                <a:schemeClr val="bg1"/>
+              </a:solidFill>
+            </a:endParaRPr>
           </a:p>
           <a:p>
             <a:endParaRPr lang="en-ZA" dirty="0"/>
@@ -6522,7 +7005,7 @@
         </p:blipFill>
         <p:spPr bwMode="auto">
           <a:xfrm>
-            <a:off x="5033963" y="1600200"/>
+            <a:off x="5580063" y="1600200"/>
             <a:ext cx="3343275" cy="3467100"/>
           </a:xfrm>
           <a:prstGeom prst="rect">
@@ -6537,15 +7020,55 @@
           </a:ln>
         </p:spPr>
       </p:pic>
+      <p:pic>
+        <p:nvPicPr>
+          <p:cNvPr id="7" name="Picture 1"/>
+          <p:cNvPicPr>
+            <a:picLocks noChangeAspect="1"/>
+          </p:cNvPicPr>
+          <p:nvPr/>
+        </p:nvPicPr>
+        <p:blipFill>
+          <a:blip r:embed="rId4"/>
+          <a:srcRect/>
+          <a:stretch>
+            <a:fillRect/>
+          </a:stretch>
+        </p:blipFill>
+        <p:spPr bwMode="auto">
+          <a:xfrm>
+            <a:off x="531813" y="5867400"/>
+            <a:ext cx="2106612" cy="317500"/>
+          </a:xfrm>
+          <a:prstGeom prst="rect">
+            <a:avLst/>
+          </a:prstGeom>
+          <a:noFill/>
+          <a:ln w="9525">
+            <a:noFill/>
+            <a:miter lim="800000"/>
+            <a:headEnd/>
+            <a:tailEnd/>
+          </a:ln>
+        </p:spPr>
+      </p:pic>
     </p:spTree>
   </p:cSld>
   <p:clrMapOvr>
     <a:masterClrMapping/>
   </p:clrMapOvr>
+  <mc:AlternateContent xmlns:mc="http://schemas.openxmlformats.org/markup-compatibility/2006">
+    <mc:Choice xmlns:p14="http://schemas.microsoft.com/office/powerpoint/2010/main" Requires="p14">
+      <p:transition spd="slow" p14:dur="2000" advTm="318"/>
+    </mc:Choice>
+    <mc:Fallback>
+      <p:transition xmlns:p14="http://schemas.microsoft.com/office/powerpoint/2010/main" spd="slow" advTm="318"/>
+    </mc:Fallback>
+  </mc:AlternateContent>
   <p:timing>
     <p:tnLst>
       <p:par>
-        <p:cTn id="1" dur="indefinite" restart="never" nodeType="tmRoot"/>
+        <p:cTn xmlns:p14="http://schemas.microsoft.com/office/powerpoint/2010/main" id="1" dur="indefinite" restart="never" nodeType="tmRoot"/>
       </p:par>
     </p:tnLst>
   </p:timing>
@@ -6649,11 +7172,6 @@
               </a:rPr>
               <a:t> characteristics</a:t>
             </a:r>
-            <a:endParaRPr lang="en-US" dirty="0" smtClean="0">
-              <a:solidFill>
-                <a:schemeClr val="bg1"/>
-              </a:solidFill>
-            </a:endParaRPr>
           </a:p>
         </p:txBody>
       </p:sp>
@@ -6827,10 +7345,18 @@
   <p:clrMapOvr>
     <a:masterClrMapping/>
   </p:clrMapOvr>
+  <mc:AlternateContent xmlns:mc="http://schemas.openxmlformats.org/markup-compatibility/2006">
+    <mc:Choice xmlns:p14="http://schemas.microsoft.com/office/powerpoint/2010/main" Requires="p14">
+      <p:transition spd="slow" p14:dur="2000" advTm="158"/>
+    </mc:Choice>
+    <mc:Fallback>
+      <p:transition xmlns:p14="http://schemas.microsoft.com/office/powerpoint/2010/main" spd="slow" advTm="158"/>
+    </mc:Fallback>
+  </mc:AlternateContent>
   <p:timing>
     <p:tnLst>
       <p:par>
-        <p:cTn id="1" dur="indefinite" restart="never" nodeType="tmRoot"/>
+        <p:cTn xmlns:p14="http://schemas.microsoft.com/office/powerpoint/2010/main" id="1" dur="indefinite" restart="never" nodeType="tmRoot"/>
       </p:par>
     </p:tnLst>
   </p:timing>
@@ -6932,21 +7458,8 @@
                   <a:schemeClr val="bg1"/>
                 </a:solidFill>
               </a:rPr>
-              <a:t> </a:t>
-            </a:r>
-            <a:r>
-              <a:rPr lang="en-US" dirty="0" smtClean="0">
-                <a:solidFill>
-                  <a:schemeClr val="bg1"/>
-                </a:solidFill>
-              </a:rPr>
-              <a:t>geometry</a:t>
-            </a:r>
-            <a:endParaRPr lang="en-US" dirty="0" smtClean="0">
-              <a:solidFill>
-                <a:schemeClr val="bg1"/>
-              </a:solidFill>
-            </a:endParaRPr>
+              <a:t> geometry</a:t>
+            </a:r>
           </a:p>
         </p:txBody>
       </p:sp>
@@ -7053,10 +7566,18 @@
   <p:clrMapOvr>
     <a:masterClrMapping/>
   </p:clrMapOvr>
+  <mc:AlternateContent xmlns:mc="http://schemas.openxmlformats.org/markup-compatibility/2006">
+    <mc:Choice xmlns:p14="http://schemas.microsoft.com/office/powerpoint/2010/main" Requires="p14">
+      <p:transition spd="slow" p14:dur="2000" advTm="172"/>
+    </mc:Choice>
+    <mc:Fallback>
+      <p:transition xmlns:p14="http://schemas.microsoft.com/office/powerpoint/2010/main" spd="slow" advTm="172"/>
+    </mc:Fallback>
+  </mc:AlternateContent>
   <p:timing>
     <p:tnLst>
       <p:par>
-        <p:cTn id="1" dur="indefinite" restart="never" nodeType="tmRoot"/>
+        <p:cTn xmlns:p14="http://schemas.microsoft.com/office/powerpoint/2010/main" id="1" dur="indefinite" restart="never" nodeType="tmRoot"/>
       </p:par>
     </p:tnLst>
   </p:timing>
@@ -7158,21 +7679,8 @@
                   <a:schemeClr val="bg1"/>
                 </a:solidFill>
               </a:rPr>
-              <a:t> </a:t>
-            </a:r>
-            <a:r>
-              <a:rPr lang="en-US" dirty="0" smtClean="0">
-                <a:solidFill>
-                  <a:schemeClr val="bg1"/>
-                </a:solidFill>
-              </a:rPr>
-              <a:t>store request</a:t>
-            </a:r>
-            <a:endParaRPr lang="en-US" dirty="0" smtClean="0">
-              <a:solidFill>
-                <a:schemeClr val="bg1"/>
-              </a:solidFill>
-            </a:endParaRPr>
+              <a:t> store request</a:t>
+            </a:r>
           </a:p>
         </p:txBody>
       </p:sp>
@@ -7279,11 +7787,11 @@
   <p:clrMapOvr>
     <a:masterClrMapping/>
   </p:clrMapOvr>
-  <p:transition/>
+  <p:transition xmlns:p14="http://schemas.microsoft.com/office/powerpoint/2010/main"/>
   <p:timing>
     <p:tnLst>
       <p:par>
-        <p:cTn id="1" dur="indefinite" restart="never" nodeType="tmRoot"/>
+        <p:cTn xmlns:p14="http://schemas.microsoft.com/office/powerpoint/2010/main" id="1" dur="indefinite" restart="never" nodeType="tmRoot"/>
       </p:par>
     </p:tnLst>
   </p:timing>
@@ -7385,21 +7893,8 @@
                   <a:schemeClr val="bg1"/>
                 </a:solidFill>
               </a:rPr>
-              <a:t> </a:t>
-            </a:r>
-            <a:r>
-              <a:rPr lang="en-US" dirty="0" smtClean="0">
-                <a:solidFill>
-                  <a:schemeClr val="bg1"/>
-                </a:solidFill>
-              </a:rPr>
-              <a:t>retrieve request</a:t>
-            </a:r>
-            <a:endParaRPr lang="en-US" dirty="0" smtClean="0">
-              <a:solidFill>
-                <a:schemeClr val="bg1"/>
-              </a:solidFill>
-            </a:endParaRPr>
+              <a:t> retrieve request</a:t>
+            </a:r>
           </a:p>
         </p:txBody>
       </p:sp>
@@ -7506,11 +8001,11 @@
   <p:clrMapOvr>
     <a:masterClrMapping/>
   </p:clrMapOvr>
-  <p:transition/>
+  <p:transition xmlns:p14="http://schemas.microsoft.com/office/powerpoint/2010/main"/>
   <p:timing>
     <p:tnLst>
       <p:par>
-        <p:cTn id="1" dur="indefinite" restart="never" nodeType="tmRoot"/>
+        <p:cTn xmlns:p14="http://schemas.microsoft.com/office/powerpoint/2010/main" id="1" dur="indefinite" restart="never" nodeType="tmRoot"/>
       </p:par>
     </p:tnLst>
   </p:timing>
@@ -7612,7 +8107,23 @@
                   <a:schemeClr val="bg1"/>
                 </a:solidFill>
               </a:rPr>
-              <a:t> implementation</a:t>
+              <a:t> </a:t>
+            </a:r>
+            <a:r>
+              <a:rPr lang="en-US" dirty="0" err="1" smtClean="0">
+                <a:solidFill>
+                  <a:schemeClr val="bg1"/>
+                </a:solidFill>
+              </a:rPr>
+              <a:t>Oversim</a:t>
+            </a:r>
+            <a:r>
+              <a:rPr lang="en-US" dirty="0" smtClean="0">
+                <a:solidFill>
+                  <a:schemeClr val="bg1"/>
+                </a:solidFill>
+              </a:rPr>
+              <a:t> simulation</a:t>
             </a:r>
             <a:endParaRPr lang="en-US" dirty="0" smtClean="0">
               <a:solidFill>
@@ -7692,8 +8203,23 @@
                   <a:schemeClr val="bg1"/>
                 </a:solidFill>
               </a:rPr>
-              <a:t>, based on the </a:t>
-            </a:r>
+              <a:t>, based on </a:t>
+            </a:r>
+            <a:r>
+              <a:rPr lang="en-US" dirty="0" smtClean="0">
+                <a:solidFill>
+                  <a:schemeClr val="bg1"/>
+                </a:solidFill>
+              </a:rPr>
+              <a:t>the</a:t>
+            </a:r>
+            <a:br>
+              <a:rPr lang="en-US" dirty="0" smtClean="0">
+                <a:solidFill>
+                  <a:schemeClr val="bg1"/>
+                </a:solidFill>
+              </a:rPr>
+            </a:br>
             <a:r>
               <a:rPr lang="en-US" dirty="0" err="1" smtClean="0">
                 <a:solidFill>
@@ -7708,36 +8234,76 @@
                   <a:schemeClr val="bg1"/>
                 </a:solidFill>
               </a:rPr>
-              <a:t>++ network simulator.</a:t>
+              <a:t>+</a:t>
+            </a:r>
+            <a:r>
+              <a:rPr lang="en-US" dirty="0" smtClean="0">
+                <a:solidFill>
+                  <a:schemeClr val="bg1"/>
+                </a:solidFill>
+              </a:rPr>
+              <a:t>+ network simulator.</a:t>
             </a:r>
           </a:p>
           <a:p>
             <a:pPr eaLnBrk="1" hangingPunct="1"/>
             <a:r>
-              <a:rPr lang="en-US" dirty="0" smtClean="0">
-                <a:solidFill>
-                  <a:schemeClr val="bg1"/>
-                </a:solidFill>
-              </a:rPr>
-              <a:t>Contains multiple underlay models</a:t>
+              <a:rPr lang="en-US" dirty="0" err="1" smtClean="0">
+                <a:solidFill>
+                  <a:schemeClr val="bg1"/>
+                </a:solidFill>
+              </a:rPr>
+              <a:t>Oversim</a:t>
+            </a:r>
+            <a:r>
+              <a:rPr lang="en-US" dirty="0" smtClean="0">
+                <a:solidFill>
+                  <a:schemeClr val="bg1"/>
+                </a:solidFill>
+              </a:rPr>
+              <a:t> contains </a:t>
+            </a:r>
+            <a:r>
+              <a:rPr lang="en-US" dirty="0" smtClean="0">
+                <a:solidFill>
+                  <a:schemeClr val="bg1"/>
+                </a:solidFill>
+              </a:rPr>
+              <a:t>multiple underlay models</a:t>
             </a:r>
           </a:p>
           <a:p>
             <a:pPr eaLnBrk="1" hangingPunct="1"/>
             <a:r>
-              <a:rPr lang="en-US" dirty="0" smtClean="0">
-                <a:solidFill>
-                  <a:schemeClr val="bg1"/>
-                </a:solidFill>
-              </a:rPr>
-              <a:t>Contains implemented P2P routing overlays (Pastry, Chord, </a:t>
-            </a:r>
-            <a:r>
               <a:rPr lang="en-US" dirty="0" err="1" smtClean="0">
                 <a:solidFill>
                   <a:schemeClr val="bg1"/>
                 </a:solidFill>
               </a:rPr>
+              <a:t>Oversim</a:t>
+            </a:r>
+            <a:r>
+              <a:rPr lang="en-US" dirty="0" smtClean="0">
+                <a:solidFill>
+                  <a:schemeClr val="bg1"/>
+                </a:solidFill>
+              </a:rPr>
+              <a:t> implements many </a:t>
+            </a:r>
+            <a:r>
+              <a:rPr lang="en-US" dirty="0" smtClean="0">
+                <a:solidFill>
+                  <a:schemeClr val="bg1"/>
+                </a:solidFill>
+              </a:rPr>
+              <a:t>P2P routing overlays (Pastry, Chord, </a:t>
+            </a:r>
+            <a:r>
+              <a:rPr lang="en-US" dirty="0" err="1" smtClean="0">
+                <a:solidFill>
+                  <a:schemeClr val="bg1"/>
+                </a:solidFill>
+              </a:rPr>
               <a:t>Kademlia</a:t>
             </a:r>
             <a:r>
@@ -7757,7 +8323,55 @@
                   <a:schemeClr val="bg1"/>
                 </a:solidFill>
               </a:rPr>
-              <a:t>Contains a DHT implementation</a:t>
+              <a:t>Statistics collection framework of </a:t>
+            </a:r>
+            <a:r>
+              <a:rPr lang="en-US" dirty="0" err="1" smtClean="0">
+                <a:solidFill>
+                  <a:schemeClr val="bg1"/>
+                </a:solidFill>
+              </a:rPr>
+              <a:t>Omnet</a:t>
+            </a:r>
+            <a:r>
+              <a:rPr lang="en-US" dirty="0" smtClean="0">
+                <a:solidFill>
+                  <a:schemeClr val="bg1"/>
+                </a:solidFill>
+              </a:rPr>
+              <a:t>++</a:t>
+            </a:r>
+            <a:endParaRPr lang="en-US" dirty="0" smtClean="0">
+              <a:solidFill>
+                <a:schemeClr val="bg1"/>
+              </a:solidFill>
+            </a:endParaRPr>
+          </a:p>
+          <a:p>
+            <a:pPr eaLnBrk="1" hangingPunct="1"/>
+            <a:r>
+              <a:rPr lang="en-US" dirty="0" smtClean="0">
+                <a:solidFill>
+                  <a:schemeClr val="bg1"/>
+                </a:solidFill>
+              </a:rPr>
+              <a:t>Contains a </a:t>
+            </a:r>
+            <a:r>
+              <a:rPr lang="en-US" dirty="0" smtClean="0">
+                <a:solidFill>
+                  <a:schemeClr val="bg1"/>
+                </a:solidFill>
+              </a:rPr>
+              <a:t>DHT storage </a:t>
+            </a:r>
+            <a:r>
+              <a:rPr lang="en-US" dirty="0" smtClean="0">
+                <a:solidFill>
+                  <a:schemeClr val="bg1"/>
+                </a:solidFill>
+              </a:rPr>
+              <a:t>implementation</a:t>
             </a:r>
           </a:p>
           <a:p>
@@ -7802,10 +8416,18 @@
   <p:clrMapOvr>
     <a:masterClrMapping/>
   </p:clrMapOvr>
+  <mc:AlternateContent xmlns:mc="http://schemas.openxmlformats.org/markup-compatibility/2006">
+    <mc:Choice xmlns:p14="http://schemas.microsoft.com/office/powerpoint/2010/main" Requires="p14">
+      <p:transition spd="slow" p14:dur="2000" advTm="119"/>
+    </mc:Choice>
+    <mc:Fallback>
+      <p:transition xmlns:p14="http://schemas.microsoft.com/office/powerpoint/2010/main" spd="slow" advTm="119"/>
+    </mc:Fallback>
+  </mc:AlternateContent>
   <p:timing>
     <p:tnLst>
       <p:par>
-        <p:cTn id="1" dur="indefinite" restart="never" nodeType="tmRoot"/>
+        <p:cTn xmlns:p14="http://schemas.microsoft.com/office/powerpoint/2010/main" id="1" dur="indefinite" restart="never" nodeType="tmRoot"/>
       </p:par>
     </p:tnLst>
   </p:timing>
@@ -7909,11 +8531,6 @@
               </a:rPr>
               <a:t> architecture</a:t>
             </a:r>
-            <a:endParaRPr lang="en-US" dirty="0" smtClean="0">
-              <a:solidFill>
-                <a:schemeClr val="bg1"/>
-              </a:solidFill>
-            </a:endParaRPr>
           </a:p>
         </p:txBody>
       </p:sp>
@@ -8020,10 +8637,18 @@
   <p:clrMapOvr>
     <a:masterClrMapping/>
   </p:clrMapOvr>
+  <mc:AlternateContent xmlns:mc="http://schemas.openxmlformats.org/markup-compatibility/2006">
+    <mc:Choice xmlns:p14="http://schemas.microsoft.com/office/powerpoint/2010/main" Requires="p14">
+      <p:transition spd="slow" p14:dur="2000" advTm="678"/>
+    </mc:Choice>
+    <mc:Fallback>
+      <p:transition xmlns:p14="http://schemas.microsoft.com/office/powerpoint/2010/main" spd="slow" advTm="678"/>
+    </mc:Fallback>
+  </mc:AlternateContent>
   <p:timing>
     <p:tnLst>
       <p:par>
-        <p:cTn id="1" dur="indefinite" restart="never" nodeType="tmRoot"/>
+        <p:cTn xmlns:p14="http://schemas.microsoft.com/office/powerpoint/2010/main" id="1" dur="indefinite" restart="never" nodeType="tmRoot"/>
       </p:par>
     </p:tnLst>
   </p:timing>
@@ -8135,11 +8760,6 @@
               </a:rPr>
               <a:t> architecture</a:t>
             </a:r>
-            <a:endParaRPr lang="en-US" dirty="0" smtClean="0">
-              <a:solidFill>
-                <a:schemeClr val="bg1"/>
-              </a:solidFill>
-            </a:endParaRPr>
           </a:p>
         </p:txBody>
       </p:sp>
@@ -8246,10 +8866,18 @@
   <p:clrMapOvr>
     <a:masterClrMapping/>
   </p:clrMapOvr>
+  <mc:AlternateContent xmlns:mc="http://schemas.openxmlformats.org/markup-compatibility/2006">
+    <mc:Choice xmlns:p14="http://schemas.microsoft.com/office/powerpoint/2010/main" Requires="p14">
+      <p:transition spd="slow" p14:dur="2000" advTm="349"/>
+    </mc:Choice>
+    <mc:Fallback>
+      <p:transition xmlns:p14="http://schemas.microsoft.com/office/powerpoint/2010/main" spd="slow" advTm="349"/>
+    </mc:Fallback>
+  </mc:AlternateContent>
   <p:timing>
     <p:tnLst>
       <p:par>
-        <p:cTn id="1" dur="indefinite" restart="never" nodeType="tmRoot"/>
+        <p:cTn xmlns:p14="http://schemas.microsoft.com/office/powerpoint/2010/main" id="1" dur="indefinite" restart="never" nodeType="tmRoot"/>
       </p:par>
     </p:tnLst>
   </p:timing>
@@ -8338,19 +8966,27 @@
           <a:p>
             <a:pPr eaLnBrk="1" hangingPunct="1"/>
             <a:r>
-              <a:rPr lang="en-US" dirty="0" smtClean="0">
-                <a:solidFill>
-                  <a:schemeClr val="bg1"/>
-                </a:solidFill>
-              </a:rPr>
-              <a:t>Extended </a:t>
-            </a:r>
-            <a:r>
               <a:rPr lang="en-US" dirty="0" err="1" smtClean="0">
                 <a:solidFill>
                   <a:schemeClr val="bg1"/>
                 </a:solidFill>
               </a:rPr>
+              <a:t>Pithos</a:t>
+            </a:r>
+            <a:r>
+              <a:rPr lang="en-US" dirty="0" smtClean="0">
+                <a:solidFill>
+                  <a:schemeClr val="bg1"/>
+                </a:solidFill>
+              </a:rPr>
+              <a:t> </a:t>
+            </a:r>
+            <a:r>
+              <a:rPr lang="en-US" dirty="0" err="1" smtClean="0">
+                <a:solidFill>
+                  <a:schemeClr val="bg1"/>
+                </a:solidFill>
+              </a:rPr>
               <a:t>Oversim</a:t>
             </a:r>
             <a:r>
@@ -8361,11 +8997,6 @@
               </a:rPr>
               <a:t> architecture</a:t>
             </a:r>
-            <a:endParaRPr lang="en-US" dirty="0" smtClean="0">
-              <a:solidFill>
-                <a:schemeClr val="bg1"/>
-              </a:solidFill>
-            </a:endParaRPr>
           </a:p>
         </p:txBody>
       </p:sp>
@@ -8472,10 +9103,18 @@
   <p:clrMapOvr>
     <a:masterClrMapping/>
   </p:clrMapOvr>
+  <mc:AlternateContent xmlns:mc="http://schemas.openxmlformats.org/markup-compatibility/2006">
+    <mc:Choice xmlns:p14="http://schemas.microsoft.com/office/powerpoint/2010/main" Requires="p14">
+      <p:transition spd="slow" p14:dur="2000" advTm="309"/>
+    </mc:Choice>
+    <mc:Fallback>
+      <p:transition xmlns:p14="http://schemas.microsoft.com/office/powerpoint/2010/main" spd="slow" advTm="309"/>
+    </mc:Fallback>
+  </mc:AlternateContent>
   <p:timing>
     <p:tnLst>
       <p:par>
-        <p:cTn id="1" dur="indefinite" restart="never" nodeType="tmRoot"/>
+        <p:cTn xmlns:p14="http://schemas.microsoft.com/office/powerpoint/2010/main" id="1" dur="indefinite" restart="never" nodeType="tmRoot"/>
       </p:par>
     </p:tnLst>
   </p:timing>
@@ -8579,11 +9218,6 @@
               </a:rPr>
               <a:t> evaluation</a:t>
             </a:r>
-            <a:endParaRPr lang="en-US" dirty="0" smtClean="0">
-              <a:solidFill>
-                <a:schemeClr val="bg1"/>
-              </a:solidFill>
-            </a:endParaRPr>
           </a:p>
         </p:txBody>
       </p:sp>
@@ -8677,8 +9311,21 @@
                   <a:schemeClr val="bg1"/>
                 </a:solidFill>
               </a:rPr>
-              <a:t>2500 peers, 100 super peers</a:t>
-            </a:r>
+              <a:t>2500 peers, 100 super </a:t>
+            </a:r>
+            <a:r>
+              <a:rPr lang="en-US" dirty="0" smtClean="0">
+                <a:solidFill>
+                  <a:schemeClr val="bg1"/>
+                </a:solidFill>
+              </a:rPr>
+              <a:t>peers</a:t>
+            </a:r>
+            <a:endParaRPr lang="en-US" dirty="0" smtClean="0">
+              <a:solidFill>
+                <a:schemeClr val="bg1"/>
+              </a:solidFill>
+            </a:endParaRPr>
           </a:p>
           <a:p>
             <a:r>
@@ -8712,45 +9359,26 @@
           </a:p>
           <a:p>
             <a:r>
-              <a:rPr lang="en-US" dirty="0" err="1" smtClean="0">
-                <a:solidFill>
-                  <a:schemeClr val="bg1"/>
-                </a:solidFill>
-              </a:rPr>
-              <a:t>Oversim</a:t>
-            </a:r>
-            <a:r>
-              <a:rPr lang="en-US" dirty="0" smtClean="0">
-                <a:solidFill>
-                  <a:schemeClr val="bg1"/>
-                </a:solidFill>
-              </a:rPr>
-              <a:t> </a:t>
-            </a:r>
-            <a:r>
-              <a:rPr lang="en-US" dirty="0" err="1" smtClean="0">
-                <a:solidFill>
-                  <a:schemeClr val="bg1"/>
-                </a:solidFill>
-              </a:rPr>
-              <a:t>SinpleUnderlay</a:t>
-            </a:r>
-            <a:r>
-              <a:rPr lang="en-US" dirty="0" smtClean="0">
-                <a:solidFill>
-                  <a:schemeClr val="bg1"/>
-                </a:solidFill>
-              </a:rPr>
-              <a:t> </a:t>
-            </a:r>
-            <a:r>
-              <a:rPr lang="en-US" dirty="0" smtClean="0">
-                <a:solidFill>
-                  <a:schemeClr val="bg1"/>
-                </a:solidFill>
-              </a:rPr>
-              <a:t>network</a:t>
-            </a:r>
+              <a:rPr lang="en-US" dirty="0" smtClean="0">
+                <a:solidFill>
+                  <a:schemeClr val="bg1"/>
+                </a:solidFill>
+              </a:rPr>
+              <a:t>Coordinate-based underla</a:t>
+            </a:r>
+            <a:r>
+              <a:rPr lang="en-US" dirty="0" smtClean="0">
+                <a:solidFill>
+                  <a:schemeClr val="bg1"/>
+                </a:solidFill>
+              </a:rPr>
+              <a:t>y network</a:t>
+            </a:r>
+            <a:endParaRPr lang="en-US" dirty="0" smtClean="0">
+              <a:solidFill>
+                <a:schemeClr val="bg1"/>
+              </a:solidFill>
+            </a:endParaRPr>
           </a:p>
           <a:p>
             <a:r>
@@ -8792,10 +9420,18 @@
   <p:clrMapOvr>
     <a:masterClrMapping/>
   </p:clrMapOvr>
+  <mc:AlternateContent xmlns:mc="http://schemas.openxmlformats.org/markup-compatibility/2006">
+    <mc:Choice xmlns:p14="http://schemas.microsoft.com/office/powerpoint/2010/main" Requires="p14">
+      <p:transition spd="slow" p14:dur="2000" advTm="248"/>
+    </mc:Choice>
+    <mc:Fallback>
+      <p:transition xmlns:p14="http://schemas.microsoft.com/office/powerpoint/2010/main" spd="slow" advTm="248"/>
+    </mc:Fallback>
+  </mc:AlternateContent>
   <p:timing>
     <p:tnLst>
       <p:par>
-        <p:cTn id="1" dur="indefinite" restart="never" nodeType="tmRoot"/>
+        <p:cTn xmlns:p14="http://schemas.microsoft.com/office/powerpoint/2010/main" id="1" dur="indefinite" restart="never" nodeType="tmRoot"/>
       </p:par>
     </p:tnLst>
   </p:timing>
@@ -8891,11 +9527,6 @@
               </a:rPr>
               <a:t>Massively Multi-user Virtual Environments (MMVEs)</a:t>
             </a:r>
-            <a:endParaRPr lang="en-US" dirty="0" smtClean="0">
-              <a:solidFill>
-                <a:schemeClr val="bg1"/>
-              </a:solidFill>
-            </a:endParaRPr>
           </a:p>
         </p:txBody>
       </p:sp>
@@ -9085,10 +9716,18 @@
   <p:clrMapOvr>
     <a:masterClrMapping/>
   </p:clrMapOvr>
+  <mc:AlternateContent xmlns:mc="http://schemas.openxmlformats.org/markup-compatibility/2006">
+    <mc:Choice xmlns:p14="http://schemas.microsoft.com/office/powerpoint/2010/main" Requires="p14">
+      <p:transition spd="slow" p14:dur="2000" advTm="216"/>
+    </mc:Choice>
+    <mc:Fallback>
+      <p:transition xmlns:p14="http://schemas.microsoft.com/office/powerpoint/2010/main" spd="slow" advTm="216"/>
+    </mc:Fallback>
+  </mc:AlternateContent>
   <p:timing>
     <p:tnLst>
       <p:par>
-        <p:cTn id="1" dur="indefinite" restart="never" nodeType="tmRoot"/>
+        <p:cTn xmlns:p14="http://schemas.microsoft.com/office/powerpoint/2010/main" id="1" dur="indefinite" restart="never" nodeType="tmRoot"/>
       </p:par>
     </p:tnLst>
   </p:timing>
@@ -9096,7 +9735,7 @@
 </file>
 
 <file path=ppt/slides/slide30.xml><?xml version="1.0" encoding="utf-8"?>
-<p:sld xmlns:a="http://schemas.openxmlformats.org/drawingml/2006/main" xmlns:r="http://schemas.openxmlformats.org/officeDocument/2006/relationships" xmlns:p="http://schemas.openxmlformats.org/presentationml/2006/main">
+<p:sld xmlns:a="http://schemas.openxmlformats.org/drawingml/2006/main" xmlns:r="http://schemas.openxmlformats.org/officeDocument/2006/relationships" xmlns:p="http://schemas.openxmlformats.org/presentationml/2006/main" show="0">
   <p:cSld>
     <p:spTree>
       <p:nvGrpSpPr>
@@ -9184,11 +9823,6 @@
               </a:rPr>
               <a:t>Evaluating storage and retrieval</a:t>
             </a:r>
-            <a:endParaRPr lang="en-US" dirty="0" smtClean="0">
-              <a:solidFill>
-                <a:schemeClr val="bg1"/>
-              </a:solidFill>
-            </a:endParaRPr>
           </a:p>
         </p:txBody>
       </p:sp>
@@ -9297,10 +9931,26 @@
                   <a:schemeClr val="bg1"/>
                 </a:solidFill>
               </a:rPr>
-              <a:t>No malicious nodes</a:t>
-            </a:r>
-          </a:p>
-          <a:p>
+              <a:t>No malicious </a:t>
+            </a:r>
+            <a:r>
+              <a:rPr lang="en-US" dirty="0" smtClean="0">
+                <a:solidFill>
+                  <a:schemeClr val="bg1"/>
+                </a:solidFill>
+              </a:rPr>
+              <a:t>nodes</a:t>
+            </a:r>
+          </a:p>
+          <a:p>
+            <a:r>
+              <a:rPr lang="en-US" dirty="0" smtClean="0">
+                <a:solidFill>
+                  <a:schemeClr val="bg1"/>
+                </a:solidFill>
+              </a:rPr>
+              <a:t>1800s node lifetime</a:t>
+            </a:r>
             <a:endParaRPr lang="en-US" dirty="0" smtClean="0">
               <a:solidFill>
                 <a:schemeClr val="bg1"/>
@@ -9308,6 +9958,13 @@
             </a:endParaRPr>
           </a:p>
           <a:p>
+            <a:endParaRPr lang="en-US" dirty="0" smtClean="0">
+              <a:solidFill>
+                <a:schemeClr val="bg1"/>
+              </a:solidFill>
+            </a:endParaRPr>
+          </a:p>
+          <a:p>
             <a:endParaRPr lang="en-ZA" dirty="0"/>
           </a:p>
         </p:txBody>
@@ -9317,10 +9974,18 @@
   <p:clrMapOvr>
     <a:masterClrMapping/>
   </p:clrMapOvr>
+  <mc:AlternateContent xmlns:mc="http://schemas.openxmlformats.org/markup-compatibility/2006">
+    <mc:Choice xmlns:p14="http://schemas.microsoft.com/office/powerpoint/2010/main" Requires="p14">
+      <p:transition spd="slow" p14:dur="2000"/>
+    </mc:Choice>
+    <mc:Fallback>
+      <p:transition xmlns:p14="http://schemas.microsoft.com/office/powerpoint/2010/main" spd="slow"/>
+    </mc:Fallback>
+  </mc:AlternateContent>
   <p:timing>
     <p:tnLst>
       <p:par>
-        <p:cTn id="1" dur="indefinite" restart="never" nodeType="tmRoot"/>
+        <p:cTn xmlns:p14="http://schemas.microsoft.com/office/powerpoint/2010/main" id="1" dur="indefinite" restart="never" nodeType="tmRoot"/>
       </p:par>
     </p:tnLst>
   </p:timing>
@@ -9328,7 +9993,7 @@
 </file>
 
 <file path=ppt/slides/slide31.xml><?xml version="1.0" encoding="utf-8"?>
-<p:sld xmlns:a="http://schemas.openxmlformats.org/drawingml/2006/main" xmlns:r="http://schemas.openxmlformats.org/officeDocument/2006/relationships" xmlns:p="http://schemas.openxmlformats.org/presentationml/2006/main">
+<p:sld xmlns:a="http://schemas.openxmlformats.org/drawingml/2006/main" xmlns:r="http://schemas.openxmlformats.org/officeDocument/2006/relationships" xmlns:p="http://schemas.openxmlformats.org/presentationml/2006/main" show="0">
   <p:cSld>
     <p:spTree>
       <p:nvGrpSpPr>
@@ -9414,29 +10079,8 @@
                   <a:schemeClr val="bg1"/>
                 </a:solidFill>
               </a:rPr>
-              <a:t>G</a:t>
-            </a:r>
-            <a:r>
-              <a:rPr lang="en-US" dirty="0" smtClean="0">
-                <a:solidFill>
-                  <a:schemeClr val="bg1"/>
-                </a:solidFill>
-              </a:rPr>
-              <a:t>roup </a:t>
-            </a:r>
-            <a:r>
-              <a:rPr lang="en-US" dirty="0" smtClean="0">
-                <a:solidFill>
-                  <a:schemeClr val="bg1"/>
-                </a:solidFill>
-              </a:rPr>
-              <a:t>storage and retrieval performance</a:t>
-            </a:r>
-            <a:endParaRPr lang="en-US" dirty="0" smtClean="0">
-              <a:solidFill>
-                <a:schemeClr val="bg1"/>
-              </a:solidFill>
-            </a:endParaRPr>
+              <a:t>Group storage and retrieval performance</a:t>
+            </a:r>
           </a:p>
         </p:txBody>
       </p:sp>
@@ -9575,10 +10219,18 @@
   <p:clrMapOvr>
     <a:masterClrMapping/>
   </p:clrMapOvr>
+  <mc:AlternateContent xmlns:mc="http://schemas.openxmlformats.org/markup-compatibility/2006">
+    <mc:Choice xmlns:p14="http://schemas.microsoft.com/office/powerpoint/2010/main" Requires="p14">
+      <p:transition spd="slow" p14:dur="2000"/>
+    </mc:Choice>
+    <mc:Fallback>
+      <p:transition xmlns:p14="http://schemas.microsoft.com/office/powerpoint/2010/main" spd="slow"/>
+    </mc:Fallback>
+  </mc:AlternateContent>
   <p:timing>
     <p:tnLst>
       <p:par>
-        <p:cTn id="1" dur="indefinite" restart="never" nodeType="tmRoot"/>
+        <p:cTn xmlns:p14="http://schemas.microsoft.com/office/powerpoint/2010/main" id="1" dur="indefinite" restart="never" nodeType="tmRoot"/>
       </p:par>
     </p:tnLst>
   </p:timing>
@@ -9586,7 +10238,7 @@
 </file>
 
 <file path=ppt/slides/slide32.xml><?xml version="1.0" encoding="utf-8"?>
-<p:sld xmlns:a="http://schemas.openxmlformats.org/drawingml/2006/main" xmlns:r="http://schemas.openxmlformats.org/officeDocument/2006/relationships" xmlns:p="http://schemas.openxmlformats.org/presentationml/2006/main">
+<p:sld xmlns:a="http://schemas.openxmlformats.org/drawingml/2006/main" xmlns:r="http://schemas.openxmlformats.org/officeDocument/2006/relationships" xmlns:p="http://schemas.openxmlformats.org/presentationml/2006/main" show="0">
   <p:cSld>
     <p:spTree>
       <p:nvGrpSpPr>
@@ -9674,11 +10326,6 @@
               </a:rPr>
               <a:t>Overlay storage and retrieval performance</a:t>
             </a:r>
-            <a:endParaRPr lang="en-US" dirty="0" smtClean="0">
-              <a:solidFill>
-                <a:schemeClr val="bg1"/>
-              </a:solidFill>
-            </a:endParaRPr>
           </a:p>
         </p:txBody>
       </p:sp>
@@ -9785,10 +10432,18 @@
   <p:clrMapOvr>
     <a:masterClrMapping/>
   </p:clrMapOvr>
+  <mc:AlternateContent xmlns:mc="http://schemas.openxmlformats.org/markup-compatibility/2006">
+    <mc:Choice xmlns:p14="http://schemas.microsoft.com/office/powerpoint/2010/main" Requires="p14">
+      <p:transition spd="slow" p14:dur="2000"/>
+    </mc:Choice>
+    <mc:Fallback>
+      <p:transition xmlns:p14="http://schemas.microsoft.com/office/powerpoint/2010/main" spd="slow"/>
+    </mc:Fallback>
+  </mc:AlternateContent>
   <p:timing>
     <p:tnLst>
       <p:par>
-        <p:cTn id="1" dur="indefinite" restart="never" nodeType="tmRoot"/>
+        <p:cTn xmlns:p14="http://schemas.microsoft.com/office/powerpoint/2010/main" id="1" dur="indefinite" restart="never" nodeType="tmRoot"/>
       </p:par>
     </p:tnLst>
   </p:timing>
@@ -9884,11 +10539,6 @@
               </a:rPr>
               <a:t>Group probability: Reliability</a:t>
             </a:r>
-            <a:endParaRPr lang="en-US" dirty="0" smtClean="0">
-              <a:solidFill>
-                <a:schemeClr val="bg1"/>
-              </a:solidFill>
-            </a:endParaRPr>
           </a:p>
         </p:txBody>
       </p:sp>
@@ -9995,10 +10645,18 @@
   <p:clrMapOvr>
     <a:masterClrMapping/>
   </p:clrMapOvr>
+  <mc:AlternateContent xmlns:mc="http://schemas.openxmlformats.org/markup-compatibility/2006">
+    <mc:Choice xmlns:p14="http://schemas.microsoft.com/office/powerpoint/2010/main" Requires="p14">
+      <p:transition spd="slow" p14:dur="2000" advTm="27657"/>
+    </mc:Choice>
+    <mc:Fallback>
+      <p:transition xmlns:p14="http://schemas.microsoft.com/office/powerpoint/2010/main" spd="slow" advTm="27657"/>
+    </mc:Fallback>
+  </mc:AlternateContent>
   <p:timing>
     <p:tnLst>
       <p:par>
-        <p:cTn id="1" dur="indefinite" restart="never" nodeType="tmRoot"/>
+        <p:cTn xmlns:p14="http://schemas.microsoft.com/office/powerpoint/2010/main" id="1" dur="indefinite" restart="never" nodeType="tmRoot"/>
       </p:par>
     </p:tnLst>
   </p:timing>
@@ -10094,11 +10752,6 @@
               </a:rPr>
               <a:t>Group probability: Bandwidth</a:t>
             </a:r>
-            <a:endParaRPr lang="en-US" dirty="0" smtClean="0">
-              <a:solidFill>
-                <a:schemeClr val="bg1"/>
-              </a:solidFill>
-            </a:endParaRPr>
           </a:p>
         </p:txBody>
       </p:sp>
@@ -10205,10 +10858,18 @@
   <p:clrMapOvr>
     <a:masterClrMapping/>
   </p:clrMapOvr>
+  <mc:AlternateContent xmlns:mc="http://schemas.openxmlformats.org/markup-compatibility/2006">
+    <mc:Choice xmlns:p14="http://schemas.microsoft.com/office/powerpoint/2010/main" Requires="p14">
+      <p:transition spd="slow" p14:dur="2000" advTm="534159"/>
+    </mc:Choice>
+    <mc:Fallback>
+      <p:transition xmlns:p14="http://schemas.microsoft.com/office/powerpoint/2010/main" spd="slow" advTm="534159"/>
+    </mc:Fallback>
+  </mc:AlternateContent>
   <p:timing>
     <p:tnLst>
       <p:par>
-        <p:cTn id="1" dur="indefinite" restart="never" nodeType="tmRoot"/>
+        <p:cTn xmlns:p14="http://schemas.microsoft.com/office/powerpoint/2010/main" id="1" dur="indefinite" restart="never" nodeType="tmRoot"/>
       </p:par>
     </p:tnLst>
   </p:timing>
@@ -10304,11 +10965,6 @@
               </a:rPr>
               <a:t>Node lifetime: Reliability</a:t>
             </a:r>
-            <a:endParaRPr lang="en-US" dirty="0" smtClean="0">
-              <a:solidFill>
-                <a:schemeClr val="bg1"/>
-              </a:solidFill>
-            </a:endParaRPr>
           </a:p>
         </p:txBody>
       </p:sp>
@@ -10415,10 +11071,18 @@
   <p:clrMapOvr>
     <a:masterClrMapping/>
   </p:clrMapOvr>
+  <mc:AlternateContent xmlns:mc="http://schemas.openxmlformats.org/markup-compatibility/2006">
+    <mc:Choice xmlns:p14="http://schemas.microsoft.com/office/powerpoint/2010/main" Requires="p14">
+      <p:transition spd="slow" p14:dur="2000" advTm="177"/>
+    </mc:Choice>
+    <mc:Fallback>
+      <p:transition xmlns:p14="http://schemas.microsoft.com/office/powerpoint/2010/main" spd="slow" advTm="177"/>
+    </mc:Fallback>
+  </mc:AlternateContent>
   <p:timing>
     <p:tnLst>
       <p:par>
-        <p:cTn id="1" dur="indefinite" restart="never" nodeType="tmRoot"/>
+        <p:cTn xmlns:p14="http://schemas.microsoft.com/office/powerpoint/2010/main" id="1" dur="indefinite" restart="never" nodeType="tmRoot"/>
       </p:par>
     </p:tnLst>
   </p:timing>
@@ -10514,11 +11178,6 @@
               </a:rPr>
               <a:t>Malicious nodes: Reliability</a:t>
             </a:r>
-            <a:endParaRPr lang="en-US" dirty="0" smtClean="0">
-              <a:solidFill>
-                <a:schemeClr val="bg1"/>
-              </a:solidFill>
-            </a:endParaRPr>
           </a:p>
         </p:txBody>
       </p:sp>
@@ -10625,10 +11284,18 @@
   <p:clrMapOvr>
     <a:masterClrMapping/>
   </p:clrMapOvr>
+  <mc:AlternateContent xmlns:mc="http://schemas.openxmlformats.org/markup-compatibility/2006">
+    <mc:Choice xmlns:p14="http://schemas.microsoft.com/office/powerpoint/2010/main" Requires="p14">
+      <p:transition spd="slow" p14:dur="2000" advTm="159"/>
+    </mc:Choice>
+    <mc:Fallback>
+      <p:transition xmlns:p14="http://schemas.microsoft.com/office/powerpoint/2010/main" spd="slow" advTm="159"/>
+    </mc:Fallback>
+  </mc:AlternateContent>
   <p:timing>
     <p:tnLst>
       <p:par>
-        <p:cTn id="1" dur="indefinite" restart="never" nodeType="tmRoot"/>
+        <p:cTn xmlns:p14="http://schemas.microsoft.com/office/powerpoint/2010/main" id="1" dur="indefinite" restart="never" nodeType="tmRoot"/>
       </p:par>
     </p:tnLst>
   </p:timing>
@@ -10732,11 +11399,6 @@
               </a:rPr>
               <a:t> fairness</a:t>
             </a:r>
-            <a:endParaRPr lang="en-US" dirty="0" smtClean="0">
-              <a:solidFill>
-                <a:schemeClr val="bg1"/>
-              </a:solidFill>
-            </a:endParaRPr>
           </a:p>
         </p:txBody>
       </p:sp>
@@ -10843,10 +11505,18 @@
   <p:clrMapOvr>
     <a:masterClrMapping/>
   </p:clrMapOvr>
+  <mc:AlternateContent xmlns:mc="http://schemas.openxmlformats.org/markup-compatibility/2006">
+    <mc:Choice xmlns:p14="http://schemas.microsoft.com/office/powerpoint/2010/main" Requires="p14">
+      <p:transition spd="slow" p14:dur="2000" advTm="201"/>
+    </mc:Choice>
+    <mc:Fallback>
+      <p:transition xmlns:p14="http://schemas.microsoft.com/office/powerpoint/2010/main" spd="slow" advTm="201"/>
+    </mc:Fallback>
+  </mc:AlternateContent>
   <p:timing>
     <p:tnLst>
       <p:par>
-        <p:cTn id="1" dur="indefinite" restart="never" nodeType="tmRoot"/>
+        <p:cTn xmlns:p14="http://schemas.microsoft.com/office/powerpoint/2010/main" id="1" dur="indefinite" restart="never" nodeType="tmRoot"/>
       </p:par>
     </p:tnLst>
   </p:timing>
@@ -10950,11 +11620,6 @@
               </a:rPr>
               <a:t> scalability</a:t>
             </a:r>
-            <a:endParaRPr lang="en-US" dirty="0" smtClean="0">
-              <a:solidFill>
-                <a:schemeClr val="bg1"/>
-              </a:solidFill>
-            </a:endParaRPr>
           </a:p>
         </p:txBody>
       </p:sp>
@@ -11061,10 +11726,18 @@
   <p:clrMapOvr>
     <a:masterClrMapping/>
   </p:clrMapOvr>
+  <mc:AlternateContent xmlns:mc="http://schemas.openxmlformats.org/markup-compatibility/2006">
+    <mc:Choice xmlns:p14="http://schemas.microsoft.com/office/powerpoint/2010/main" Requires="p14">
+      <p:transition spd="slow" p14:dur="2000" advTm="387"/>
+    </mc:Choice>
+    <mc:Fallback>
+      <p:transition xmlns:p14="http://schemas.microsoft.com/office/powerpoint/2010/main" spd="slow" advTm="387"/>
+    </mc:Fallback>
+  </mc:AlternateContent>
   <p:timing>
     <p:tnLst>
       <p:par>
-        <p:cTn id="1" dur="indefinite" restart="never" nodeType="tmRoot"/>
+        <p:cTn xmlns:p14="http://schemas.microsoft.com/office/powerpoint/2010/main" id="1" dur="indefinite" restart="never" nodeType="tmRoot"/>
       </p:par>
     </p:tnLst>
   </p:timing>
@@ -11160,11 +11833,6 @@
               </a:rPr>
               <a:t>Conclusion</a:t>
             </a:r>
-            <a:endParaRPr lang="en-US" dirty="0" smtClean="0">
-              <a:solidFill>
-                <a:schemeClr val="bg1"/>
-              </a:solidFill>
-            </a:endParaRPr>
           </a:p>
         </p:txBody>
       </p:sp>
@@ -11185,8 +11853,8 @@
         </p:blipFill>
         <p:spPr bwMode="auto">
           <a:xfrm>
-            <a:off x="6175375" y="4754563"/>
-            <a:ext cx="2968625" cy="2098675"/>
+            <a:off x="7454900" y="5659124"/>
+            <a:ext cx="1689100" cy="1194113"/>
           </a:xfrm>
           <a:prstGeom prst="rect">
             <a:avLst/>
@@ -11200,9 +11868,128 @@
           </a:ln>
         </p:spPr>
       </p:pic>
+      <p:sp>
+        <p:nvSpPr>
+          <p:cNvPr id="7" name="Content Placeholder 6"/>
+          <p:cNvSpPr>
+            <a:spLocks noGrp="1"/>
+          </p:cNvSpPr>
+          <p:nvPr>
+            <p:ph idx="1"/>
+          </p:nvPr>
+        </p:nvSpPr>
+        <p:spPr>
+          <a:xfrm>
+            <a:off x="457200" y="1214438"/>
+            <a:ext cx="8229600" cy="4525963"/>
+          </a:xfrm>
+        </p:spPr>
+        <p:txBody>
+          <a:bodyPr/>
+          <a:lstStyle/>
+          <a:p>
+            <a:r>
+              <a:rPr lang="en-US" dirty="0" smtClean="0">
+                <a:solidFill>
+                  <a:schemeClr val="bg1"/>
+                </a:solidFill>
+              </a:rPr>
+              <a:t>Developed a generic state consistency model for MMVEs.</a:t>
+            </a:r>
+          </a:p>
+          <a:p>
+            <a:r>
+              <a:rPr lang="en-US" dirty="0" smtClean="0">
+                <a:solidFill>
+                  <a:schemeClr val="bg1"/>
+                </a:solidFill>
+              </a:rPr>
+              <a:t>Investigated issue of state management and state persistency for P2P MMVEs.</a:t>
+            </a:r>
+          </a:p>
+          <a:p>
+            <a:r>
+              <a:rPr lang="en-US" dirty="0" smtClean="0">
+                <a:solidFill>
+                  <a:schemeClr val="bg1"/>
+                </a:solidFill>
+              </a:rPr>
+              <a:t>Found that highly scalable, fair and highly responsive storage is still lacking.</a:t>
+            </a:r>
+          </a:p>
+          <a:p>
+            <a:r>
+              <a:rPr lang="en-US" dirty="0" smtClean="0">
+                <a:solidFill>
+                  <a:schemeClr val="bg1"/>
+                </a:solidFill>
+              </a:rPr>
+              <a:t>Developed </a:t>
+            </a:r>
+            <a:r>
+              <a:rPr lang="en-US" dirty="0" err="1" smtClean="0">
+                <a:solidFill>
+                  <a:schemeClr val="bg1"/>
+                </a:solidFill>
+              </a:rPr>
+              <a:t>Pithos</a:t>
+            </a:r>
+            <a:r>
+              <a:rPr lang="en-US" dirty="0" smtClean="0">
+                <a:solidFill>
+                  <a:schemeClr val="bg1"/>
+                </a:solidFill>
+              </a:rPr>
+              <a:t> to satisfy identified storage requirements for P2P MMVEs.</a:t>
+            </a:r>
+          </a:p>
+          <a:p>
+            <a:r>
+              <a:rPr lang="en-US" dirty="0" smtClean="0">
+                <a:solidFill>
+                  <a:schemeClr val="bg1"/>
+                </a:solidFill>
+              </a:rPr>
+              <a:t>Evaluated </a:t>
+            </a:r>
+            <a:r>
+              <a:rPr lang="en-US" dirty="0" err="1" smtClean="0">
+                <a:solidFill>
+                  <a:schemeClr val="bg1"/>
+                </a:solidFill>
+              </a:rPr>
+              <a:t>Pithos</a:t>
+            </a:r>
+            <a:r>
+              <a:rPr lang="en-US" dirty="0" smtClean="0">
+                <a:solidFill>
+                  <a:schemeClr val="bg1"/>
+                </a:solidFill>
+              </a:rPr>
+              <a:t> as an </a:t>
+            </a:r>
+            <a:r>
+              <a:rPr lang="en-US" dirty="0" err="1" smtClean="0">
+                <a:solidFill>
+                  <a:schemeClr val="bg1"/>
+                </a:solidFill>
+              </a:rPr>
+              <a:t>Oversim</a:t>
+            </a:r>
+            <a:r>
+              <a:rPr lang="en-US" dirty="0" smtClean="0">
+                <a:solidFill>
+                  <a:schemeClr val="bg1"/>
+                </a:solidFill>
+              </a:rPr>
+              <a:t> simulation</a:t>
+            </a:r>
+          </a:p>
+        </p:txBody>
+      </p:sp>
       <p:pic>
         <p:nvPicPr>
-          <p:cNvPr id="8" name="Picture 1"/>
+          <p:cNvPr id="9" name="Picture 1"/>
           <p:cNvPicPr>
             <a:picLocks noChangeAspect="1"/>
           </p:cNvPicPr>
@@ -11217,7 +12004,7 @@
         </p:blipFill>
         <p:spPr bwMode="auto">
           <a:xfrm>
-            <a:off x="531813" y="5867400"/>
+            <a:off x="531813" y="6184900"/>
             <a:ext cx="2106612" cy="317500"/>
           </a:xfrm>
           <a:prstGeom prst="rect">
@@ -11232,64 +12019,23 @@
           </a:ln>
         </p:spPr>
       </p:pic>
-      <p:sp>
-        <p:nvSpPr>
-          <p:cNvPr id="7" name="Content Placeholder 6"/>
-          <p:cNvSpPr>
-            <a:spLocks noGrp="1"/>
-          </p:cNvSpPr>
-          <p:nvPr>
-            <p:ph idx="1"/>
-          </p:nvPr>
-        </p:nvSpPr>
-        <p:spPr/>
-        <p:txBody>
-          <a:bodyPr/>
-          <a:lstStyle/>
-          <a:p>
-            <a:r>
-              <a:rPr lang="en-US" dirty="0" smtClean="0">
-                <a:solidFill>
-                  <a:schemeClr val="bg1"/>
-                </a:solidFill>
-              </a:rPr>
-              <a:t>Fast storage, fast retrieval</a:t>
-            </a:r>
-          </a:p>
-          <a:p>
-            <a:r>
-              <a:rPr lang="en-US" dirty="0" smtClean="0">
-                <a:solidFill>
-                  <a:schemeClr val="bg1"/>
-                </a:solidFill>
-              </a:rPr>
-              <a:t>100% group probability</a:t>
-            </a:r>
-          </a:p>
-          <a:p>
-            <a:r>
-              <a:rPr lang="en-US" dirty="0" smtClean="0">
-                <a:solidFill>
-                  <a:schemeClr val="bg1"/>
-                </a:solidFill>
-              </a:rPr>
-              <a:t>No malicious nodes</a:t>
-            </a:r>
-          </a:p>
-          <a:p>
-            <a:endParaRPr lang="en-ZA" dirty="0"/>
-          </a:p>
-        </p:txBody>
-      </p:sp>
     </p:spTree>
   </p:cSld>
   <p:clrMapOvr>
     <a:masterClrMapping/>
   </p:clrMapOvr>
+  <mc:AlternateContent xmlns:mc="http://schemas.openxmlformats.org/markup-compatibility/2006">
+    <mc:Choice xmlns:p14="http://schemas.microsoft.com/office/powerpoint/2010/main" Requires="p14">
+      <p:transition spd="slow" p14:dur="2000" advTm="30058"/>
+    </mc:Choice>
+    <mc:Fallback>
+      <p:transition xmlns:p14="http://schemas.microsoft.com/office/powerpoint/2010/main" spd="slow" advTm="30058"/>
+    </mc:Fallback>
+  </mc:AlternateContent>
   <p:timing>
     <p:tnLst>
       <p:par>
-        <p:cTn id="1" dur="indefinite" restart="never" nodeType="tmRoot"/>
+        <p:cTn xmlns:p14="http://schemas.microsoft.com/office/powerpoint/2010/main" id="1" dur="indefinite" restart="never" nodeType="tmRoot"/>
       </p:par>
     </p:tnLst>
   </p:timing>
@@ -11385,11 +12131,6 @@
               </a:rPr>
               <a:t>MMVE examples: Eve Online</a:t>
             </a:r>
-            <a:endParaRPr lang="en-US" dirty="0" smtClean="0">
-              <a:solidFill>
-                <a:schemeClr val="bg1"/>
-              </a:solidFill>
-            </a:endParaRPr>
           </a:p>
         </p:txBody>
       </p:sp>
@@ -11421,10 +12162,18 @@
   <p:clrMapOvr>
     <a:masterClrMapping/>
   </p:clrMapOvr>
+  <mc:AlternateContent xmlns:mc="http://schemas.openxmlformats.org/markup-compatibility/2006">
+    <mc:Choice xmlns:p14="http://schemas.microsoft.com/office/powerpoint/2010/main" Requires="p14">
+      <p:transition spd="slow" p14:dur="2000" advTm="154"/>
+    </mc:Choice>
+    <mc:Fallback>
+      <p:transition xmlns:p14="http://schemas.microsoft.com/office/powerpoint/2010/main" spd="slow" advTm="154"/>
+    </mc:Fallback>
+  </mc:AlternateContent>
   <p:timing>
     <p:tnLst>
       <p:par>
-        <p:cTn id="1" dur="indefinite" restart="never" nodeType="tmRoot"/>
+        <p:cTn xmlns:p14="http://schemas.microsoft.com/office/powerpoint/2010/main" id="1" dur="indefinite" restart="never" nodeType="tmRoot"/>
       </p:par>
     </p:tnLst>
   </p:timing>
@@ -11569,10 +12318,18 @@
   <p:clrMapOvr>
     <a:masterClrMapping/>
   </p:clrMapOvr>
+  <mc:AlternateContent xmlns:mc="http://schemas.openxmlformats.org/markup-compatibility/2006">
+    <mc:Choice xmlns:p14="http://schemas.microsoft.com/office/powerpoint/2010/main" Requires="p14">
+      <p:transition spd="slow" p14:dur="2000" advTm="138"/>
+    </mc:Choice>
+    <mc:Fallback>
+      <p:transition xmlns:p14="http://schemas.microsoft.com/office/powerpoint/2010/main" spd="slow" advTm="138"/>
+    </mc:Fallback>
+  </mc:AlternateContent>
   <p:timing>
     <p:tnLst>
       <p:par>
-        <p:cTn id="1" dur="indefinite" restart="never" nodeType="tmRoot"/>
+        <p:cTn xmlns:p14="http://schemas.microsoft.com/office/powerpoint/2010/main" id="1" dur="indefinite" restart="never" nodeType="tmRoot"/>
       </p:par>
     </p:tnLst>
   </p:timing>
@@ -11666,7 +12423,7 @@
                   <a:schemeClr val="bg1"/>
                 </a:solidFill>
               </a:rPr>
-              <a:t>Peer-to-peer (P2P) networks</a:t>
+              <a:t>Issues of Client/Server MMEs</a:t>
             </a:r>
             <a:endParaRPr lang="en-US" dirty="0" smtClean="0">
               <a:solidFill>
@@ -11698,21 +12455,8 @@
                   <a:schemeClr val="bg1"/>
                 </a:solidFill>
               </a:rPr>
-              <a:t>High degree of </a:t>
-            </a:r>
-            <a:r>
-              <a:rPr lang="en-US" dirty="0" err="1" smtClean="0">
-                <a:solidFill>
-                  <a:schemeClr val="bg1"/>
-                </a:solidFill>
-              </a:rPr>
-              <a:t>decentralisation</a:t>
-            </a:r>
-            <a:endParaRPr lang="en-US" dirty="0" smtClean="0">
-              <a:solidFill>
-                <a:schemeClr val="bg1"/>
-              </a:solidFill>
-            </a:endParaRPr>
+              <a:t>High cost of robustness</a:t>
+            </a:r>
           </a:p>
           <a:p>
             <a:pPr eaLnBrk="1" hangingPunct="1"/>
@@ -11722,21 +12466,8 @@
                   <a:schemeClr val="bg1"/>
                 </a:solidFill>
               </a:rPr>
-              <a:t>Self-</a:t>
-            </a:r>
-            <a:r>
-              <a:rPr lang="en-US" dirty="0" err="1" smtClean="0">
-                <a:solidFill>
-                  <a:schemeClr val="bg1"/>
-                </a:solidFill>
-              </a:rPr>
-              <a:t>organisation</a:t>
-            </a:r>
-            <a:endParaRPr lang="en-US" dirty="0" smtClean="0">
-              <a:solidFill>
-                <a:schemeClr val="bg1"/>
-              </a:solidFill>
-            </a:endParaRPr>
+              <a:t>High cost of scalability</a:t>
+            </a:r>
           </a:p>
           <a:p>
             <a:pPr eaLnBrk="1" hangingPunct="1"/>
@@ -11746,7 +12477,7 @@
                   <a:schemeClr val="bg1"/>
                 </a:solidFill>
               </a:rPr>
-              <a:t>Multiple administrative domains</a:t>
+              <a:t>High operator cost</a:t>
             </a:r>
           </a:p>
           <a:p>
@@ -11757,11 +12488,30 @@
                   <a:schemeClr val="bg1"/>
                 </a:solidFill>
               </a:rPr>
-              <a:t>P2P routing overlay</a:t>
+              <a:t>Low responsiveness</a:t>
             </a:r>
           </a:p>
           <a:p>
             <a:pPr eaLnBrk="1" hangingPunct="1"/>
+            <a:r>
+              <a:rPr lang="en-US" dirty="0" smtClean="0">
+                <a:solidFill>
+                  <a:schemeClr val="bg1"/>
+                </a:solidFill>
+              </a:rPr>
+              <a:t>High amount of required server bandwidth</a:t>
+            </a:r>
+          </a:p>
+          <a:p>
+            <a:pPr eaLnBrk="1" hangingPunct="1"/>
+            <a:r>
+              <a:rPr lang="en-US" dirty="0" smtClean="0">
+                <a:solidFill>
+                  <a:schemeClr val="bg1"/>
+                </a:solidFill>
+              </a:rPr>
+              <a:t>Weak handling of transient loads</a:t>
+            </a:r>
             <a:endParaRPr lang="en-US" dirty="0" smtClean="0">
               <a:solidFill>
                 <a:schemeClr val="bg1"/>
@@ -11839,10 +12589,18 @@
   <p:clrMapOvr>
     <a:masterClrMapping/>
   </p:clrMapOvr>
+  <mc:AlternateContent xmlns:mc="http://schemas.openxmlformats.org/markup-compatibility/2006">
+    <mc:Choice xmlns:p14="http://schemas.microsoft.com/office/powerpoint/2010/main" Requires="p14">
+      <p:transition spd="slow" p14:dur="2000" advTm="123"/>
+    </mc:Choice>
+    <mc:Fallback>
+      <p:transition xmlns:p14="http://schemas.microsoft.com/office/powerpoint/2010/main" spd="slow" advTm="123"/>
+    </mc:Fallback>
+  </mc:AlternateContent>
   <p:timing>
     <p:tnLst>
       <p:par>
-        <p:cTn id="1" dur="indefinite" restart="never" nodeType="tmRoot"/>
+        <p:cTn xmlns:p14="http://schemas.microsoft.com/office/powerpoint/2010/main" id="1" dur="indefinite" restart="never" nodeType="tmRoot"/>
       </p:par>
     </p:tnLst>
   </p:timing>
@@ -11936,13 +12694,8 @@
                   <a:schemeClr val="bg1"/>
                 </a:solidFill>
               </a:rPr>
-              <a:t>P2P advantages</a:t>
-            </a:r>
-            <a:endParaRPr lang="en-US" dirty="0" smtClean="0">
-              <a:solidFill>
-                <a:schemeClr val="bg1"/>
-              </a:solidFill>
-            </a:endParaRPr>
+              <a:t>P2P MMVE proposal</a:t>
+            </a:r>
           </a:p>
         </p:txBody>
       </p:sp>
@@ -11968,7 +12721,7 @@
                   <a:schemeClr val="bg1"/>
                 </a:solidFill>
               </a:rPr>
-              <a:t>Low barrier to entry</a:t>
+              <a:t>Increased robustness</a:t>
             </a:r>
           </a:p>
           <a:p>
@@ -11979,26 +12732,18 @@
                   <a:schemeClr val="bg1"/>
                 </a:solidFill>
               </a:rPr>
-              <a:t>Scalability</a:t>
+              <a:t>Improved scalability</a:t>
             </a:r>
           </a:p>
           <a:p>
             <a:pPr eaLnBrk="1" hangingPunct="1"/>
             <a:r>
-              <a:rPr lang="en-US" dirty="0" err="1" smtClean="0">
-                <a:solidFill>
-                  <a:schemeClr val="bg1"/>
-                </a:solidFill>
-              </a:rPr>
-              <a:t>Resistence</a:t>
-            </a:r>
-            <a:r>
-              <a:rPr lang="en-US" dirty="0" smtClean="0">
-                <a:solidFill>
-                  <a:schemeClr val="bg1"/>
-                </a:solidFill>
-              </a:rPr>
-              <a:t> to faults and attacks</a:t>
+              <a:rPr lang="en-US" dirty="0" smtClean="0">
+                <a:solidFill>
+                  <a:schemeClr val="bg1"/>
+                </a:solidFill>
+              </a:rPr>
+              <a:t>Lower operator costs</a:t>
             </a:r>
           </a:p>
           <a:p>
@@ -12009,11 +12754,49 @@
                   <a:schemeClr val="bg1"/>
                 </a:solidFill>
               </a:rPr>
+              <a:t>Improved handling of transient loads</a:t>
+            </a:r>
+          </a:p>
+          <a:p>
+            <a:pPr eaLnBrk="1" hangingPunct="1"/>
+            <a:r>
+              <a:rPr lang="en-US" dirty="0" smtClean="0">
+                <a:solidFill>
+                  <a:schemeClr val="bg1"/>
+                </a:solidFill>
+              </a:rPr>
+              <a:t>Improved </a:t>
+            </a:r>
+            <a:r>
+              <a:rPr lang="en-US" dirty="0" smtClean="0">
+                <a:solidFill>
+                  <a:schemeClr val="bg1"/>
+                </a:solidFill>
+              </a:rPr>
+              <a:t>responsiveness</a:t>
+            </a:r>
+          </a:p>
+          <a:p>
+            <a:pPr eaLnBrk="1" hangingPunct="1"/>
+            <a:r>
+              <a:rPr lang="en-US" dirty="0" smtClean="0">
+                <a:solidFill>
+                  <a:schemeClr val="bg1"/>
+                </a:solidFill>
+              </a:rPr>
               <a:t>Abundance and availability of resources</a:t>
             </a:r>
           </a:p>
           <a:p>
             <a:pPr eaLnBrk="1" hangingPunct="1"/>
+            <a:r>
+              <a:rPr lang="en-US" dirty="0" smtClean="0">
+                <a:solidFill>
+                  <a:schemeClr val="bg1"/>
+                </a:solidFill>
+              </a:rPr>
+              <a:t>Resistance to faults and attacks</a:t>
+            </a:r>
             <a:endParaRPr lang="en-US" dirty="0" smtClean="0">
               <a:solidFill>
                 <a:schemeClr val="bg1"/>
@@ -12087,14 +12870,27 @@
         </p:spPr>
       </p:pic>
     </p:spTree>
+    <p:extLst>
+      <p:ext uri="{BB962C8B-B14F-4D97-AF65-F5344CB8AC3E}">
+        <p14:creationId xmlns:p14="http://schemas.microsoft.com/office/powerpoint/2010/main" val="2494923949"/>
+      </p:ext>
+    </p:extLst>
   </p:cSld>
   <p:clrMapOvr>
     <a:masterClrMapping/>
   </p:clrMapOvr>
+  <mc:AlternateContent xmlns:mc="http://schemas.openxmlformats.org/markup-compatibility/2006">
+    <mc:Choice xmlns:p14="http://schemas.microsoft.com/office/powerpoint/2010/main" Requires="p14">
+      <p:transition spd="slow" p14:dur="2000" advTm="213"/>
+    </mc:Choice>
+    <mc:Fallback>
+      <p:transition xmlns:p14="http://schemas.microsoft.com/office/powerpoint/2010/main" spd="slow" advTm="213"/>
+    </mc:Fallback>
+  </mc:AlternateContent>
   <p:timing>
     <p:tnLst>
       <p:par>
-        <p:cTn id="1" dur="indefinite" restart="never" nodeType="tmRoot"/>
+        <p:cTn xmlns:p14="http://schemas.microsoft.com/office/powerpoint/2010/main" id="1" dur="indefinite" restart="never" nodeType="tmRoot"/>
       </p:par>
     </p:tnLst>
   </p:timing>
@@ -12102,7 +12898,7 @@
 </file>
 
 <file path=ppt/slides/slide8.xml><?xml version="1.0" encoding="utf-8"?>
-<p:sld xmlns:a="http://schemas.openxmlformats.org/drawingml/2006/main" xmlns:r="http://schemas.openxmlformats.org/officeDocument/2006/relationships" xmlns:p="http://schemas.openxmlformats.org/presentationml/2006/main">
+<p:sld xmlns:a="http://schemas.openxmlformats.org/drawingml/2006/main" xmlns:r="http://schemas.openxmlformats.org/officeDocument/2006/relationships" xmlns:p="http://schemas.openxmlformats.org/presentationml/2006/main" show="0">
   <p:cSld>
     <p:spTree>
       <p:nvGrpSpPr>
@@ -12188,7 +12984,42 @@
                   <a:schemeClr val="bg1"/>
                 </a:solidFill>
               </a:rPr>
-              <a:t>P2P MMVE proposal</a:t>
+              <a:t>Peer-to-peer (P2P) networks</a:t>
+            </a:r>
+          </a:p>
+        </p:txBody>
+      </p:sp>
+      <p:sp>
+        <p:nvSpPr>
+          <p:cNvPr id="15363" name="Content Placeholder 5"/>
+          <p:cNvSpPr>
+            <a:spLocks noGrp="1"/>
+          </p:cNvSpPr>
+          <p:nvPr>
+            <p:ph idx="1"/>
+          </p:nvPr>
+        </p:nvSpPr>
+        <p:spPr/>
+        <p:txBody>
+          <a:bodyPr/>
+          <a:lstStyle/>
+          <a:p>
+            <a:pPr eaLnBrk="1" hangingPunct="1"/>
+            <a:r>
+              <a:rPr lang="en-US" dirty="0" smtClean="0">
+                <a:solidFill>
+                  <a:schemeClr val="bg1"/>
+                </a:solidFill>
+              </a:rPr>
+              <a:t>High degree of </a:t>
+            </a:r>
+            <a:r>
+              <a:rPr lang="en-US" dirty="0" err="1" smtClean="0">
+                <a:solidFill>
+                  <a:schemeClr val="bg1"/>
+                </a:solidFill>
+              </a:rPr>
+              <a:t>decentralisation</a:t>
             </a:r>
             <a:endParaRPr lang="en-US" dirty="0" smtClean="0">
               <a:solidFill>
@@ -12196,22 +13027,6 @@
               </a:solidFill>
             </a:endParaRPr>
           </a:p>
-        </p:txBody>
-      </p:sp>
-      <p:sp>
-        <p:nvSpPr>
-          <p:cNvPr id="15363" name="Content Placeholder 5"/>
-          <p:cNvSpPr>
-            <a:spLocks noGrp="1"/>
-          </p:cNvSpPr>
-          <p:nvPr>
-            <p:ph idx="1"/>
-          </p:nvPr>
-        </p:nvSpPr>
-        <p:spPr/>
-        <p:txBody>
-          <a:bodyPr/>
-          <a:lstStyle/>
           <a:p>
             <a:pPr eaLnBrk="1" hangingPunct="1"/>
             <a:r>
@@ -12220,51 +13035,15 @@
                   <a:schemeClr val="bg1"/>
                 </a:solidFill>
               </a:rPr>
-              <a:t>Increased robustness</a:t>
-            </a:r>
-          </a:p>
-          <a:p>
-            <a:pPr eaLnBrk="1" hangingPunct="1"/>
-            <a:r>
-              <a:rPr lang="en-US" dirty="0" smtClean="0">
-                <a:solidFill>
-                  <a:schemeClr val="bg1"/>
-                </a:solidFill>
-              </a:rPr>
-              <a:t>Improved scalability</a:t>
-            </a:r>
-          </a:p>
-          <a:p>
-            <a:pPr eaLnBrk="1" hangingPunct="1"/>
-            <a:r>
-              <a:rPr lang="en-US" dirty="0" smtClean="0">
-                <a:solidFill>
-                  <a:schemeClr val="bg1"/>
-                </a:solidFill>
-              </a:rPr>
-              <a:t>Lower operator costs</a:t>
-            </a:r>
-          </a:p>
-          <a:p>
-            <a:pPr eaLnBrk="1" hangingPunct="1"/>
-            <a:r>
-              <a:rPr lang="en-US" dirty="0" smtClean="0">
-                <a:solidFill>
-                  <a:schemeClr val="bg1"/>
-                </a:solidFill>
-              </a:rPr>
-              <a:t>Improved handling of transient loads</a:t>
-            </a:r>
-          </a:p>
-          <a:p>
-            <a:pPr eaLnBrk="1" hangingPunct="1"/>
-            <a:r>
-              <a:rPr lang="en-US" dirty="0" smtClean="0">
-                <a:solidFill>
-                  <a:schemeClr val="bg1"/>
-                </a:solidFill>
-              </a:rPr>
-              <a:t>Improved responsiveness</a:t>
+              <a:t>Self-</a:t>
+            </a:r>
+            <a:r>
+              <a:rPr lang="en-US" dirty="0" err="1" smtClean="0">
+                <a:solidFill>
+                  <a:schemeClr val="bg1"/>
+                </a:solidFill>
+              </a:rPr>
+              <a:t>organisation</a:t>
             </a:r>
             <a:endParaRPr lang="en-US" dirty="0" smtClean="0">
               <a:solidFill>
@@ -12272,43 +13051,41 @@
               </a:solidFill>
             </a:endParaRPr>
           </a:p>
+          <a:p>
+            <a:pPr eaLnBrk="1" hangingPunct="1"/>
+            <a:r>
+              <a:rPr lang="en-US" dirty="0" smtClean="0">
+                <a:solidFill>
+                  <a:schemeClr val="bg1"/>
+                </a:solidFill>
+              </a:rPr>
+              <a:t>Multiple administrative domains</a:t>
+            </a:r>
+          </a:p>
+          <a:p>
+            <a:pPr eaLnBrk="1" hangingPunct="1"/>
+            <a:r>
+              <a:rPr lang="en-US" dirty="0" smtClean="0">
+                <a:solidFill>
+                  <a:schemeClr val="bg1"/>
+                </a:solidFill>
+              </a:rPr>
+              <a:t>P2P routing overlay</a:t>
+            </a:r>
+          </a:p>
+          <a:p>
+            <a:pPr eaLnBrk="1" hangingPunct="1"/>
+            <a:endParaRPr lang="en-US" dirty="0" smtClean="0">
+              <a:solidFill>
+                <a:schemeClr val="bg1"/>
+              </a:solidFill>
+            </a:endParaRPr>
+          </a:p>
         </p:txBody>
       </p:sp>
       <p:pic>
         <p:nvPicPr>
           <p:cNvPr id="15364" name="Picture 1"/>
-          <p:cNvPicPr>
-            <a:picLocks noChangeAspect="1"/>
-          </p:cNvPicPr>
-          <p:nvPr/>
-        </p:nvPicPr>
-        <p:blipFill>
-          <a:blip r:embed="rId2"/>
-          <a:srcRect/>
-          <a:stretch>
-            <a:fillRect/>
-          </a:stretch>
-        </p:blipFill>
-        <p:spPr bwMode="auto">
-          <a:xfrm>
-            <a:off x="531813" y="5867400"/>
-            <a:ext cx="2106612" cy="317500"/>
-          </a:xfrm>
-          <a:prstGeom prst="rect">
-            <a:avLst/>
-          </a:prstGeom>
-          <a:noFill/>
-          <a:ln w="9525">
-            <a:noFill/>
-            <a:miter lim="800000"/>
-            <a:headEnd/>
-            <a:tailEnd/>
-          </a:ln>
-        </p:spPr>
-      </p:pic>
-      <p:pic>
-        <p:nvPicPr>
-          <p:cNvPr id="15365" name="Picture 8" descr="Final MIH logo.png"/>
           <p:cNvPicPr>
             <a:picLocks noChangeAspect="1"/>
           </p:cNvPicPr>
@@ -12323,8 +13100,8 @@
         </p:blipFill>
         <p:spPr bwMode="auto">
           <a:xfrm>
-            <a:off x="6175375" y="4754563"/>
-            <a:ext cx="2968625" cy="2098675"/>
+            <a:off x="531813" y="5867400"/>
+            <a:ext cx="2106612" cy="317500"/>
           </a:xfrm>
           <a:prstGeom prst="rect">
             <a:avLst/>
@@ -12338,15 +13115,55 @@
           </a:ln>
         </p:spPr>
       </p:pic>
+      <p:pic>
+        <p:nvPicPr>
+          <p:cNvPr id="15365" name="Picture 8" descr="Final MIH logo.png"/>
+          <p:cNvPicPr>
+            <a:picLocks noChangeAspect="1"/>
+          </p:cNvPicPr>
+          <p:nvPr/>
+        </p:nvPicPr>
+        <p:blipFill>
+          <a:blip r:embed="rId4"/>
+          <a:srcRect/>
+          <a:stretch>
+            <a:fillRect/>
+          </a:stretch>
+        </p:blipFill>
+        <p:spPr bwMode="auto">
+          <a:xfrm>
+            <a:off x="6175375" y="4754563"/>
+            <a:ext cx="2968625" cy="2098675"/>
+          </a:xfrm>
+          <a:prstGeom prst="rect">
+            <a:avLst/>
+          </a:prstGeom>
+          <a:noFill/>
+          <a:ln w="9525">
+            <a:noFill/>
+            <a:miter lim="800000"/>
+            <a:headEnd/>
+            <a:tailEnd/>
+          </a:ln>
+        </p:spPr>
+      </p:pic>
     </p:spTree>
   </p:cSld>
   <p:clrMapOvr>
     <a:masterClrMapping/>
   </p:clrMapOvr>
+  <mc:AlternateContent xmlns:mc="http://schemas.openxmlformats.org/markup-compatibility/2006">
+    <mc:Choice xmlns:p14="http://schemas.microsoft.com/office/powerpoint/2010/main" Requires="p14">
+      <p:transition spd="slow" p14:dur="2000" advTm="85933"/>
+    </mc:Choice>
+    <mc:Fallback>
+      <p:transition xmlns:p14="http://schemas.microsoft.com/office/powerpoint/2010/main" spd="slow" advTm="85933"/>
+    </mc:Fallback>
+  </mc:AlternateContent>
   <p:timing>
     <p:tnLst>
       <p:par>
-        <p:cTn id="1" dur="indefinite" restart="never" nodeType="tmRoot"/>
+        <p:cTn xmlns:p14="http://schemas.microsoft.com/office/powerpoint/2010/main" id="1" dur="indefinite" restart="never" nodeType="tmRoot"/>
       </p:par>
     </p:tnLst>
   </p:timing>
@@ -12354,7 +13171,7 @@
 </file>
 
 <file path=ppt/slides/slide9.xml><?xml version="1.0" encoding="utf-8"?>
-<p:sld xmlns:a="http://schemas.openxmlformats.org/drawingml/2006/main" xmlns:r="http://schemas.openxmlformats.org/officeDocument/2006/relationships" xmlns:p="http://schemas.openxmlformats.org/presentationml/2006/main">
+<p:sld xmlns:a="http://schemas.openxmlformats.org/drawingml/2006/main" xmlns:r="http://schemas.openxmlformats.org/officeDocument/2006/relationships" xmlns:p="http://schemas.openxmlformats.org/presentationml/2006/main" show="0">
   <p:cSld>
     <p:spTree>
       <p:nvGrpSpPr>
@@ -12442,11 +13259,6 @@
               </a:rPr>
               <a:t>Challenges of P2P MMVEs</a:t>
             </a:r>
-            <a:endParaRPr lang="en-US" dirty="0" smtClean="0">
-              <a:solidFill>
-                <a:schemeClr val="bg1"/>
-              </a:solidFill>
-            </a:endParaRPr>
           </a:p>
         </p:txBody>
       </p:sp>
@@ -12598,10 +13410,18 @@
   <p:clrMapOvr>
     <a:masterClrMapping/>
   </p:clrMapOvr>
+  <mc:AlternateContent xmlns:mc="http://schemas.openxmlformats.org/markup-compatibility/2006">
+    <mc:Choice xmlns:p14="http://schemas.microsoft.com/office/powerpoint/2010/main" Requires="p14">
+      <p:transition spd="slow" p14:dur="2000" advTm="129969"/>
+    </mc:Choice>
+    <mc:Fallback>
+      <p:transition xmlns:p14="http://schemas.microsoft.com/office/powerpoint/2010/main" spd="slow" advTm="129969"/>
+    </mc:Fallback>
+  </mc:AlternateContent>
   <p:timing>
     <p:tnLst>
       <p:par>
-        <p:cTn id="1" dur="indefinite" restart="never" nodeType="tmRoot"/>
+        <p:cTn xmlns:p14="http://schemas.microsoft.com/office/powerpoint/2010/main" id="1" dur="indefinite" restart="never" nodeType="tmRoot"/>
       </p:par>
     </p:tnLst>
   </p:timing>
@@ -12926,4 +13746,324 @@
   </a:objectDefaults>
   <a:extraClrSchemeLst/>
 </a:theme>
+</file>
+
+<file path=ppt/theme/theme2.xml><?xml version="1.0" encoding="utf-8"?>
+<a:theme xmlns:a="http://schemas.openxmlformats.org/drawingml/2006/main" name="Office Theme">
+  <a:themeElements>
+    <a:clrScheme name="Office">
+      <a:dk1>
+        <a:sysClr val="windowText" lastClr="000000"/>
+      </a:dk1>
+      <a:lt1>
+        <a:sysClr val="window" lastClr="FFFFFF"/>
+      </a:lt1>
+      <a:dk2>
+        <a:srgbClr val="1F497D"/>
+      </a:dk2>
+      <a:lt2>
+        <a:srgbClr val="EEECE1"/>
+      </a:lt2>
+      <a:accent1>
+        <a:srgbClr val="4F81BD"/>
+      </a:accent1>
+      <a:accent2>
+        <a:srgbClr val="C0504D"/>
+      </a:accent2>
+      <a:accent3>
+        <a:srgbClr val="9BBB59"/>
+      </a:accent3>
+      <a:accent4>
+        <a:srgbClr val="8064A2"/>
+      </a:accent4>
+      <a:accent5>
+        <a:srgbClr val="4BACC6"/>
+      </a:accent5>
+      <a:accent6>
+        <a:srgbClr val="F79646"/>
+      </a:accent6>
+      <a:hlink>
+        <a:srgbClr val="0000FF"/>
+      </a:hlink>
+      <a:folHlink>
+        <a:srgbClr val="800080"/>
+      </a:folHlink>
+    </a:clrScheme>
+    <a:fontScheme name="Office">
+      <a:majorFont>
+        <a:latin typeface="Calibri"/>
+        <a:ea typeface=""/>
+        <a:cs typeface=""/>
+        <a:font script="Jpan" typeface="ＭＳ Ｐゴシック"/>
+        <a:font script="Hang" typeface="맑은 고딕"/>
+        <a:font script="Hans" typeface="宋体"/>
+        <a:font script="Hant" typeface="新細明體"/>
+        <a:font script="Arab" typeface="Times New Roman"/>
+        <a:font script="Hebr" typeface="Times New Roman"/>
+        <a:font script="Thai" typeface="Angsana New"/>
+        <a:font script="Ethi" typeface="Nyala"/>
+        <a:font script="Beng" typeface="Vrinda"/>
+        <a:font script="Gujr" typeface="Shruti"/>
+        <a:font script="Khmr" typeface="MoolBoran"/>
+        <a:font script="Knda" typeface="Tunga"/>
+        <a:font script="Guru" typeface="Raavi"/>
+        <a:font script="Cans" typeface="Euphemia"/>
+        <a:font script="Cher" typeface="Plantagenet Cherokee"/>
+        <a:font script="Yiii" typeface="Microsoft Yi Baiti"/>
+        <a:font script="Tibt" typeface="Microsoft Himalaya"/>
+        <a:font script="Thaa" typeface="MV Boli"/>
+        <a:font script="Deva" typeface="Mangal"/>
+        <a:font script="Telu" typeface="Gautami"/>
+        <a:font script="Taml" typeface="Latha"/>
+        <a:font script="Syrc" typeface="Estrangelo Edessa"/>
+        <a:font script="Orya" typeface="Kalinga"/>
+        <a:font script="Mlym" typeface="Kartika"/>
+        <a:font script="Laoo" typeface="DokChampa"/>
+        <a:font script="Sinh" typeface="Iskoola Pota"/>
+        <a:font script="Mong" typeface="Mongolian Baiti"/>
+        <a:font script="Viet" typeface="Times New Roman"/>
+        <a:font script="Uigh" typeface="Microsoft Uighur"/>
+        <a:font script="Geor" typeface="Sylfaen"/>
+      </a:majorFont>
+      <a:minorFont>
+        <a:latin typeface="Calibri"/>
+        <a:ea typeface=""/>
+        <a:cs typeface=""/>
+        <a:font script="Jpan" typeface="ＭＳ Ｐゴシック"/>
+        <a:font script="Hang" typeface="맑은 고딕"/>
+        <a:font script="Hans" typeface="宋体"/>
+        <a:font script="Hant" typeface="新細明體"/>
+        <a:font script="Arab" typeface="Arial"/>
+        <a:font script="Hebr" typeface="Arial"/>
+        <a:font script="Thai" typeface="Cordia New"/>
+        <a:font script="Ethi" typeface="Nyala"/>
+        <a:font script="Beng" typeface="Vrinda"/>
+        <a:font script="Gujr" typeface="Shruti"/>
+        <a:font script="Khmr" typeface="DaunPenh"/>
+        <a:font script="Knda" typeface="Tunga"/>
+        <a:font script="Guru" typeface="Raavi"/>
+        <a:font script="Cans" typeface="Euphemia"/>
+        <a:font script="Cher" typeface="Plantagenet Cherokee"/>
+        <a:font script="Yiii" typeface="Microsoft Yi Baiti"/>
+        <a:font script="Tibt" typeface="Microsoft Himalaya"/>
+        <a:font script="Thaa" typeface="MV Boli"/>
+        <a:font script="Deva" typeface="Mangal"/>
+        <a:font script="Telu" typeface="Gautami"/>
+        <a:font script="Taml" typeface="Latha"/>
+        <a:font script="Syrc" typeface="Estrangelo Edessa"/>
+        <a:font script="Orya" typeface="Kalinga"/>
+        <a:font script="Mlym" typeface="Kartika"/>
+        <a:font script="Laoo" typeface="DokChampa"/>
+        <a:font script="Sinh" typeface="Iskoola Pota"/>
+        <a:font script="Mong" typeface="Mongolian Baiti"/>
+        <a:font script="Viet" typeface="Arial"/>
+        <a:font script="Uigh" typeface="Microsoft Uighur"/>
+        <a:font script="Geor" typeface="Sylfaen"/>
+      </a:minorFont>
+    </a:fontScheme>
+    <a:fmtScheme name="Office">
+      <a:fillStyleLst>
+        <a:solidFill>
+          <a:schemeClr val="phClr"/>
+        </a:solidFill>
+        <a:gradFill rotWithShape="1">
+          <a:gsLst>
+            <a:gs pos="0">
+              <a:schemeClr val="phClr">
+                <a:tint val="50000"/>
+                <a:satMod val="300000"/>
+              </a:schemeClr>
+            </a:gs>
+            <a:gs pos="35000">
+              <a:schemeClr val="phClr">
+                <a:tint val="37000"/>
+                <a:satMod val="300000"/>
+              </a:schemeClr>
+            </a:gs>
+            <a:gs pos="100000">
+              <a:schemeClr val="phClr">
+                <a:tint val="15000"/>
+                <a:satMod val="350000"/>
+              </a:schemeClr>
+            </a:gs>
+          </a:gsLst>
+          <a:lin ang="16200000" scaled="1"/>
+        </a:gradFill>
+        <a:gradFill rotWithShape="1">
+          <a:gsLst>
+            <a:gs pos="0">
+              <a:schemeClr val="phClr">
+                <a:tint val="100000"/>
+                <a:shade val="100000"/>
+                <a:satMod val="130000"/>
+              </a:schemeClr>
+            </a:gs>
+            <a:gs pos="100000">
+              <a:schemeClr val="phClr">
+                <a:tint val="50000"/>
+                <a:shade val="100000"/>
+                <a:satMod val="350000"/>
+              </a:schemeClr>
+            </a:gs>
+          </a:gsLst>
+          <a:lin ang="16200000" scaled="0"/>
+        </a:gradFill>
+      </a:fillStyleLst>
+      <a:lnStyleLst>
+        <a:ln w="9525" cap="flat" cmpd="sng" algn="ctr">
+          <a:solidFill>
+            <a:schemeClr val="phClr">
+              <a:shade val="95000"/>
+              <a:satMod val="105000"/>
+            </a:schemeClr>
+          </a:solidFill>
+          <a:prstDash val="solid"/>
+        </a:ln>
+        <a:ln w="25400" cap="flat" cmpd="sng" algn="ctr">
+          <a:solidFill>
+            <a:schemeClr val="phClr"/>
+          </a:solidFill>
+          <a:prstDash val="solid"/>
+        </a:ln>
+        <a:ln w="38100" cap="flat" cmpd="sng" algn="ctr">
+          <a:solidFill>
+            <a:schemeClr val="phClr"/>
+          </a:solidFill>
+          <a:prstDash val="solid"/>
+        </a:ln>
+      </a:lnStyleLst>
+      <a:effectStyleLst>
+        <a:effectStyle>
+          <a:effectLst>
+            <a:outerShdw blurRad="40000" dist="20000" dir="5400000" rotWithShape="0">
+              <a:srgbClr val="000000">
+                <a:alpha val="38000"/>
+              </a:srgbClr>
+            </a:outerShdw>
+          </a:effectLst>
+        </a:effectStyle>
+        <a:effectStyle>
+          <a:effectLst>
+            <a:outerShdw blurRad="40000" dist="23000" dir="5400000" rotWithShape="0">
+              <a:srgbClr val="000000">
+                <a:alpha val="35000"/>
+              </a:srgbClr>
+            </a:outerShdw>
+          </a:effectLst>
+        </a:effectStyle>
+        <a:effectStyle>
+          <a:effectLst>
+            <a:outerShdw blurRad="40000" dist="23000" dir="5400000" rotWithShape="0">
+              <a:srgbClr val="000000">
+                <a:alpha val="35000"/>
+              </a:srgbClr>
+            </a:outerShdw>
+          </a:effectLst>
+          <a:scene3d>
+            <a:camera prst="orthographicFront">
+              <a:rot lat="0" lon="0" rev="0"/>
+            </a:camera>
+            <a:lightRig rig="threePt" dir="t">
+              <a:rot lat="0" lon="0" rev="1200000"/>
+            </a:lightRig>
+          </a:scene3d>
+          <a:sp3d>
+            <a:bevelT w="63500" h="25400"/>
+          </a:sp3d>
+        </a:effectStyle>
+      </a:effectStyleLst>
+      <a:bgFillStyleLst>
+        <a:solidFill>
+          <a:schemeClr val="phClr"/>
+        </a:solidFill>
+        <a:gradFill rotWithShape="1">
+          <a:gsLst>
+            <a:gs pos="0">
+              <a:schemeClr val="phClr">
+                <a:tint val="40000"/>
+                <a:satMod val="350000"/>
+              </a:schemeClr>
+            </a:gs>
+            <a:gs pos="40000">
+              <a:schemeClr val="phClr">
+                <a:tint val="45000"/>
+                <a:shade val="99000"/>
+                <a:satMod val="350000"/>
+              </a:schemeClr>
+            </a:gs>
+            <a:gs pos="100000">
+              <a:schemeClr val="phClr">
+                <a:shade val="20000"/>
+                <a:satMod val="255000"/>
+              </a:schemeClr>
+            </a:gs>
+          </a:gsLst>
+          <a:path path="circle">
+            <a:fillToRect l="50000" t="-80000" r="50000" b="180000"/>
+          </a:path>
+        </a:gradFill>
+        <a:gradFill rotWithShape="1">
+          <a:gsLst>
+            <a:gs pos="0">
+              <a:schemeClr val="phClr">
+                <a:tint val="80000"/>
+                <a:satMod val="300000"/>
+              </a:schemeClr>
+            </a:gs>
+            <a:gs pos="100000">
+              <a:schemeClr val="phClr">
+                <a:shade val="30000"/>
+                <a:satMod val="200000"/>
+              </a:schemeClr>
+            </a:gs>
+          </a:gsLst>
+          <a:path path="circle">
+            <a:fillToRect l="50000" t="50000" r="50000" b="50000"/>
+          </a:path>
+        </a:gradFill>
+      </a:bgFillStyleLst>
+    </a:fmtScheme>
+  </a:themeElements>
+  <a:objectDefaults>
+    <a:spDef>
+      <a:spPr/>
+      <a:bodyPr/>
+      <a:lstStyle/>
+      <a:style>
+        <a:lnRef idx="1">
+          <a:schemeClr val="accent1"/>
+        </a:lnRef>
+        <a:fillRef idx="3">
+          <a:schemeClr val="accent1"/>
+        </a:fillRef>
+        <a:effectRef idx="2">
+          <a:schemeClr val="accent1"/>
+        </a:effectRef>
+        <a:fontRef idx="minor">
+          <a:schemeClr val="lt1"/>
+        </a:fontRef>
+      </a:style>
+    </a:spDef>
+    <a:lnDef>
+      <a:spPr/>
+      <a:bodyPr/>
+      <a:lstStyle/>
+      <a:style>
+        <a:lnRef idx="2">
+          <a:schemeClr val="accent1"/>
+        </a:lnRef>
+        <a:fillRef idx="0">
+          <a:schemeClr val="accent1"/>
+        </a:fillRef>
+        <a:effectRef idx="1">
+          <a:schemeClr val="accent1"/>
+        </a:effectRef>
+        <a:fontRef idx="minor">
+          <a:schemeClr val="tx1"/>
+        </a:fontRef>
+      </a:style>
+    </a:lnDef>
+  </a:objectDefaults>
+  <a:extraClrSchemeLst/>
+</a:theme>
 </file>
</xml_diff>